<commit_message>
Tradução README.md e Slides de 05 - Numeric Variables
</commit_message>
<xml_diff>
--- a/python-for-beginners/Slides/5 - NumericVariables.pptx
+++ b/python-for-beginners/Slides/5 - NumericVariables.pptx
@@ -490,7 +490,7 @@
               <a:rPr lang="en-US" smtClean="0">
                 <a:latin typeface="Segoe UI" pitchFamily="34" charset="0"/>
               </a:rPr>
-              <a:t>6/17/2019 10:34 AM</a:t>
+              <a:t>7/15/2020 11:40 AM</a:t>
             </a:fld>
             <a:endParaRPr lang="en-US">
               <a:latin typeface="Segoe UI" pitchFamily="34" charset="0"/>
@@ -768,7 +768,7 @@
           <a:p>
             <a:fld id="{38EEC551-8CDA-4EB6-89BB-2A86C9F091C8}" type="datetime8">
               <a:rPr lang="en-US" smtClean="0"/>
-              <a:t>6/17/2019 10:34 AM</a:t>
+              <a:t>7/15/2020 11:40 AM</a:t>
             </a:fld>
             <a:endParaRPr lang="en-US"/>
           </a:p>
@@ -1102,7 +1102,7 @@
           <a:p>
             <a:fld id="{6108602D-D426-4C00-B215-BFA18C076426}" type="datetime8">
               <a:rPr lang="en-US" smtClean="0"/>
-              <a:t>6/17/2019 10:34 AM</a:t>
+              <a:t>7/15/2020 11:40 AM</a:t>
             </a:fld>
             <a:endParaRPr lang="en-US"/>
           </a:p>
@@ -1267,7 +1267,7 @@
           <a:p>
             <a:fld id="{6108602D-D426-4C00-B215-BFA18C076426}" type="datetime8">
               <a:rPr lang="en-US" smtClean="0"/>
-              <a:t>6/17/2019 10:34 AM</a:t>
+              <a:t>7/15/2020 11:40 AM</a:t>
             </a:fld>
             <a:endParaRPr lang="en-US"/>
           </a:p>
@@ -1432,7 +1432,7 @@
           <a:p>
             <a:fld id="{6108602D-D426-4C00-B215-BFA18C076426}" type="datetime8">
               <a:rPr lang="en-US" smtClean="0"/>
-              <a:t>6/17/2019 10:34 AM</a:t>
+              <a:t>7/15/2020 11:40 AM</a:t>
             </a:fld>
             <a:endParaRPr lang="en-US"/>
           </a:p>
@@ -1597,7 +1597,7 @@
           <a:p>
             <a:fld id="{6108602D-D426-4C00-B215-BFA18C076426}" type="datetime8">
               <a:rPr lang="en-US" smtClean="0"/>
-              <a:t>6/17/2019 10:34 AM</a:t>
+              <a:t>7/15/2020 11:40 AM</a:t>
             </a:fld>
             <a:endParaRPr lang="en-US"/>
           </a:p>
@@ -1762,7 +1762,7 @@
           <a:p>
             <a:fld id="{6108602D-D426-4C00-B215-BFA18C076426}" type="datetime8">
               <a:rPr lang="en-US" smtClean="0"/>
-              <a:t>6/17/2019 10:34 AM</a:t>
+              <a:t>7/15/2020 11:40 AM</a:t>
             </a:fld>
             <a:endParaRPr lang="en-US"/>
           </a:p>
@@ -1927,7 +1927,7 @@
           <a:p>
             <a:fld id="{6108602D-D426-4C00-B215-BFA18C076426}" type="datetime8">
               <a:rPr lang="en-US" smtClean="0"/>
-              <a:t>6/17/2019 10:34 AM</a:t>
+              <a:t>7/15/2020 11:40 AM</a:t>
             </a:fld>
             <a:endParaRPr lang="en-US"/>
           </a:p>
@@ -2092,7 +2092,7 @@
           <a:p>
             <a:fld id="{6108602D-D426-4C00-B215-BFA18C076426}" type="datetime8">
               <a:rPr lang="en-US" smtClean="0"/>
-              <a:t>6/17/2019 10:34 AM</a:t>
+              <a:t>7/15/2020 11:40 AM</a:t>
             </a:fld>
             <a:endParaRPr lang="en-US"/>
           </a:p>
@@ -2257,7 +2257,7 @@
           <a:p>
             <a:fld id="{6108602D-D426-4C00-B215-BFA18C076426}" type="datetime8">
               <a:rPr lang="en-US" smtClean="0"/>
-              <a:t>6/17/2019 10:34 AM</a:t>
+              <a:t>7/15/2020 11:40 AM</a:t>
             </a:fld>
             <a:endParaRPr lang="en-US"/>
           </a:p>
@@ -40555,13 +40555,34 @@
           </a:lstStyle>
           <a:p>
             <a:r>
-              <a:rPr lang="en-US">
+              <a:rPr lang="en-US" dirty="0" err="1">
                 <a:solidFill>
                   <a:schemeClr val="bg1"/>
                 </a:solidFill>
               </a:rPr>
-              <a:t>Working with numbers</a:t>
+              <a:t>Trabalhando</a:t>
             </a:r>
+            <a:r>
+              <a:rPr lang="en-US" dirty="0">
+                <a:solidFill>
+                  <a:schemeClr val="bg1"/>
+                </a:solidFill>
+              </a:rPr>
+              <a:t> com </a:t>
+            </a:r>
+            <a:r>
+              <a:rPr lang="en-US" dirty="0" err="1">
+                <a:solidFill>
+                  <a:schemeClr val="bg1"/>
+                </a:solidFill>
+              </a:rPr>
+              <a:t>números</a:t>
+            </a:r>
+            <a:endParaRPr lang="en-US" dirty="0">
+              <a:solidFill>
+                <a:schemeClr val="bg1"/>
+              </a:solidFill>
+            </a:endParaRPr>
           </a:p>
         </p:txBody>
       </p:sp>
@@ -40657,9 +40678,10 @@
           <a:lstStyle/>
           <a:p>
             <a:r>
-              <a:rPr lang="en-US" b="1"/>
-              <a:t>Numbers can be stored in variables</a:t>
+              <a:rPr lang="pt-BR" sz="4400" b="1" dirty="0"/>
+              <a:t>Números podem ser armazenados em variáveis</a:t>
             </a:r>
+            <a:endParaRPr lang="en-US" sz="4400" b="1" dirty="0"/>
           </a:p>
         </p:txBody>
       </p:sp>
@@ -40684,24 +40706,24 @@
           <a:lstStyle/>
           <a:p>
             <a:r>
-              <a:rPr lang="en-CA"/>
+              <a:rPr lang="en-CA" dirty="0"/>
               <a:t>pi = 3.14159</a:t>
             </a:r>
           </a:p>
           <a:p>
             <a:r>
-              <a:rPr lang="en-CA"/>
+              <a:rPr lang="en-CA" dirty="0"/>
               <a:t>print(pi)</a:t>
             </a:r>
           </a:p>
           <a:p>
-            <a:endParaRPr lang="en-CA"/>
+            <a:endParaRPr lang="en-CA" dirty="0"/>
           </a:p>
           <a:p>
-            <a:endParaRPr lang="en-CA"/>
+            <a:endParaRPr lang="en-CA" dirty="0"/>
           </a:p>
           <a:p>
-            <a:endParaRPr lang="en-CA"/>
+            <a:endParaRPr lang="en-CA" dirty="0"/>
           </a:p>
         </p:txBody>
       </p:sp>
@@ -41110,10 +41132,10 @@
           <a:lstStyle/>
           <a:p>
             <a:r>
-              <a:rPr lang="en-US" b="1"/>
-              <a:t>You can do math with numbers </a:t>
+              <a:rPr lang="pt-BR" b="1" dirty="0"/>
+              <a:t>Você pode fazer contas com números</a:t>
             </a:r>
-            <a:endParaRPr lang="en-US"/>
+            <a:endParaRPr lang="en-US" dirty="0"/>
           </a:p>
         </p:txBody>
       </p:sp>
@@ -41138,39 +41160,39 @@
           <a:lstStyle/>
           <a:p>
             <a:r>
-              <a:rPr lang="en-US" err="1"/>
+              <a:rPr lang="en-US" dirty="0" err="1"/>
               <a:t>first_num</a:t>
             </a:r>
             <a:r>
-              <a:rPr lang="en-US"/>
+              <a:rPr lang="en-US" dirty="0"/>
               <a:t> = 6</a:t>
             </a:r>
           </a:p>
           <a:p>
             <a:r>
-              <a:rPr lang="en-US" err="1"/>
+              <a:rPr lang="en-US" dirty="0" err="1"/>
               <a:t>second_num</a:t>
             </a:r>
             <a:r>
-              <a:rPr lang="en-US"/>
+              <a:rPr lang="en-US" dirty="0"/>
               <a:t> = 2</a:t>
             </a:r>
           </a:p>
           <a:p>
             <a:r>
-              <a:rPr lang="en-US"/>
+              <a:rPr lang="en-US" dirty="0"/>
               <a:t>print(</a:t>
             </a:r>
             <a:r>
-              <a:rPr lang="en-US" err="1"/>
+              <a:rPr lang="en-US" dirty="0" err="1"/>
               <a:t>first_num</a:t>
             </a:r>
             <a:r>
-              <a:rPr lang="en-US"/>
+              <a:rPr lang="en-US" dirty="0"/>
               <a:t> </a:t>
             </a:r>
             <a:r>
-              <a:rPr lang="en-US">
+              <a:rPr lang="en-US" dirty="0">
                 <a:highlight>
                   <a:srgbClr val="FFFF00"/>
                 </a:highlight>
@@ -41178,33 +41200,33 @@
               <a:t>+</a:t>
             </a:r>
             <a:r>
-              <a:rPr lang="en-US"/>
+              <a:rPr lang="en-US" dirty="0"/>
               <a:t> </a:t>
             </a:r>
             <a:r>
-              <a:rPr lang="en-US" err="1"/>
+              <a:rPr lang="en-US" dirty="0" err="1"/>
               <a:t>second_num</a:t>
             </a:r>
             <a:r>
-              <a:rPr lang="en-US"/>
+              <a:rPr lang="en-US" dirty="0"/>
               <a:t>)</a:t>
             </a:r>
           </a:p>
           <a:p>
             <a:r>
-              <a:rPr lang="en-US"/>
+              <a:rPr lang="en-US" dirty="0"/>
               <a:t>print(</a:t>
             </a:r>
             <a:r>
-              <a:rPr lang="en-US" err="1"/>
+              <a:rPr lang="en-US" dirty="0" err="1"/>
               <a:t>first_num</a:t>
             </a:r>
             <a:r>
-              <a:rPr lang="en-US"/>
+              <a:rPr lang="en-US" dirty="0"/>
               <a:t> </a:t>
             </a:r>
             <a:r>
-              <a:rPr lang="en-US">
+              <a:rPr lang="en-US" dirty="0">
                 <a:highlight>
                   <a:srgbClr val="FFFF00"/>
                 </a:highlight>
@@ -41212,29 +41234,29 @@
               <a:t>**</a:t>
             </a:r>
             <a:r>
-              <a:rPr lang="en-US"/>
+              <a:rPr lang="en-US" dirty="0"/>
               <a:t> </a:t>
             </a:r>
             <a:r>
-              <a:rPr lang="en-US" err="1"/>
+              <a:rPr lang="en-US" dirty="0" err="1"/>
               <a:t>second_num</a:t>
             </a:r>
             <a:r>
-              <a:rPr lang="en-US"/>
+              <a:rPr lang="en-US" dirty="0"/>
               <a:t>)</a:t>
             </a:r>
           </a:p>
           <a:p>
-            <a:endParaRPr lang="en-US"/>
+            <a:endParaRPr lang="en-US" dirty="0"/>
           </a:p>
           <a:p>
-            <a:endParaRPr lang="en-CA"/>
+            <a:endParaRPr lang="en-CA" dirty="0"/>
           </a:p>
           <a:p>
-            <a:endParaRPr lang="en-CA"/>
+            <a:endParaRPr lang="en-CA" dirty="0"/>
           </a:p>
           <a:p>
-            <a:endParaRPr lang="en-CA"/>
+            <a:endParaRPr lang="en-CA" dirty="0"/>
           </a:p>
         </p:txBody>
       </p:sp>
@@ -41533,7 +41555,7 @@
           <p:nvPr>
             <p:extLst>
               <p:ext uri="{D42A27DB-BD31-4B8C-83A1-F6EECF244321}">
-                <p14:modId xmlns:p14="http://schemas.microsoft.com/office/powerpoint/2010/main" val="2844523041"/>
+                <p14:modId xmlns:p14="http://schemas.microsoft.com/office/powerpoint/2010/main" val="254462116"/>
               </p:ext>
             </p:extLst>
           </p:nvPr>
@@ -41571,9 +41593,10 @@
                     <a:lstStyle/>
                     <a:p>
                       <a:r>
-                        <a:rPr lang="en-CA"/>
-                        <a:t>Symbol</a:t>
+                        <a:rPr lang="en-CA" dirty="0" err="1"/>
+                        <a:t>Simbolo</a:t>
                       </a:r>
+                      <a:endParaRPr lang="en-CA" dirty="0"/>
                     </a:p>
                   </a:txBody>
                   <a:tcPr/>
@@ -41584,9 +41607,10 @@
                     <a:lstStyle/>
                     <a:p>
                       <a:r>
-                        <a:rPr lang="en-CA"/>
-                        <a:t>Operation</a:t>
+                        <a:rPr lang="en-CA" dirty="0" err="1"/>
+                        <a:t>Operação</a:t>
                       </a:r>
+                      <a:endParaRPr lang="en-CA" dirty="0"/>
                     </a:p>
                   </a:txBody>
                   <a:tcPr/>
@@ -41617,8 +41641,8 @@
                     <a:lstStyle/>
                     <a:p>
                       <a:r>
-                        <a:rPr lang="en-CA" b="1"/>
-                        <a:t>Addition</a:t>
+                        <a:rPr lang="en-CA" b="1" dirty="0"/>
+                        <a:t>Soma</a:t>
                       </a:r>
                     </a:p>
                   </a:txBody>
@@ -41650,9 +41674,10 @@
                     <a:lstStyle/>
                     <a:p>
                       <a:r>
-                        <a:rPr lang="en-CA" b="1"/>
-                        <a:t>Subtraction</a:t>
+                        <a:rPr lang="en-CA" b="1" dirty="0" err="1"/>
+                        <a:t>Subtração</a:t>
                       </a:r>
+                      <a:endParaRPr lang="en-CA" b="1" dirty="0"/>
                     </a:p>
                   </a:txBody>
                   <a:tcPr/>
@@ -41683,9 +41708,10 @@
                     <a:lstStyle/>
                     <a:p>
                       <a:r>
-                        <a:rPr lang="en-CA" b="1"/>
-                        <a:t>Multiplication</a:t>
+                        <a:rPr lang="en-CA" b="1" dirty="0" err="1"/>
+                        <a:t>Multiplicação</a:t>
                       </a:r>
+                      <a:endParaRPr lang="en-CA" b="1" dirty="0"/>
                     </a:p>
                   </a:txBody>
                   <a:tcPr/>
@@ -41716,9 +41742,10 @@
                     <a:lstStyle/>
                     <a:p>
                       <a:r>
-                        <a:rPr lang="en-CA" b="1"/>
-                        <a:t>Division</a:t>
+                        <a:rPr lang="en-CA" b="1" dirty="0" err="1"/>
+                        <a:t>Divisão</a:t>
                       </a:r>
+                      <a:endParaRPr lang="en-CA" b="1" dirty="0"/>
                     </a:p>
                   </a:txBody>
                   <a:tcPr/>
@@ -41749,9 +41776,10 @@
                     <a:lstStyle/>
                     <a:p>
                       <a:r>
-                        <a:rPr lang="en-CA" b="1"/>
-                        <a:t>Exponent</a:t>
+                        <a:rPr lang="en-CA" b="1" dirty="0" err="1"/>
+                        <a:t>Exponenciação</a:t>
                       </a:r>
+                      <a:endParaRPr lang="en-CA" b="1" dirty="0"/>
                     </a:p>
                   </a:txBody>
                   <a:tcPr/>
@@ -41898,10 +41926,10 @@
           <a:lstStyle/>
           <a:p>
             <a:r>
-              <a:rPr lang="en-US" b="1"/>
-              <a:t>If you combine strings with numbers, Python gets confused</a:t>
+              <a:rPr lang="pt-BR" b="1" dirty="0"/>
+              <a:t>Se você combinar strings com números, o Python ficará confuso</a:t>
             </a:r>
-            <a:endParaRPr lang="en-US"/>
+            <a:endParaRPr lang="en-US" dirty="0"/>
           </a:p>
         </p:txBody>
       </p:sp>
@@ -41966,7 +41994,61 @@
                 </a:solidFill>
                 <a:latin typeface="Consolas"/>
               </a:rPr>
-              <a:t>' days in February'</a:t>
+              <a:t>' </a:t>
+            </a:r>
+            <a:r>
+              <a:rPr lang="en-US" dirty="0" err="1">
+                <a:solidFill>
+                  <a:srgbClr val="C00000"/>
+                </a:solidFill>
+                <a:latin typeface="Consolas"/>
+              </a:rPr>
+              <a:t>dias</a:t>
+            </a:r>
+            <a:r>
+              <a:rPr lang="en-US" dirty="0">
+                <a:solidFill>
+                  <a:srgbClr val="C00000"/>
+                </a:solidFill>
+                <a:latin typeface="Consolas"/>
+              </a:rPr>
+              <a:t> </a:t>
+            </a:r>
+            <a:r>
+              <a:rPr lang="en-US" dirty="0" err="1">
+                <a:solidFill>
+                  <a:srgbClr val="C00000"/>
+                </a:solidFill>
+                <a:latin typeface="Consolas"/>
+              </a:rPr>
+              <a:t>em</a:t>
+            </a:r>
+            <a:r>
+              <a:rPr lang="en-US" dirty="0">
+                <a:solidFill>
+                  <a:srgbClr val="C00000"/>
+                </a:solidFill>
+                <a:latin typeface="Consolas"/>
+              </a:rPr>
+              <a:t> </a:t>
+            </a:r>
+            <a:r>
+              <a:rPr lang="en-US" dirty="0" err="1">
+                <a:solidFill>
+                  <a:srgbClr val="C00000"/>
+                </a:solidFill>
+                <a:latin typeface="Consolas"/>
+              </a:rPr>
+              <a:t>fevereiro</a:t>
+            </a:r>
+            <a:r>
+              <a:rPr lang="en-US" dirty="0">
+                <a:solidFill>
+                  <a:srgbClr val="C00000"/>
+                </a:solidFill>
+                <a:latin typeface="Consolas"/>
+              </a:rPr>
+              <a:t>'</a:t>
             </a:r>
             <a:r>
               <a:rPr lang="en-US" dirty="0">
@@ -42283,7 +42365,61 @@
                 </a:solidFill>
                 <a:latin typeface="Consolas"/>
               </a:rPr>
-              <a:t>+ ' days in February')</a:t>
+              <a:t>+ ' </a:t>
+            </a:r>
+            <a:r>
+              <a:rPr lang="en-US" dirty="0" err="1">
+                <a:solidFill>
+                  <a:schemeClr val="bg1"/>
+                </a:solidFill>
+                <a:latin typeface="Consolas"/>
+              </a:rPr>
+              <a:t>dias</a:t>
+            </a:r>
+            <a:r>
+              <a:rPr lang="en-US" dirty="0">
+                <a:solidFill>
+                  <a:schemeClr val="bg1"/>
+                </a:solidFill>
+                <a:latin typeface="Consolas"/>
+              </a:rPr>
+              <a:t> </a:t>
+            </a:r>
+            <a:r>
+              <a:rPr lang="en-US" dirty="0" err="1">
+                <a:solidFill>
+                  <a:schemeClr val="bg1"/>
+                </a:solidFill>
+                <a:latin typeface="Consolas"/>
+              </a:rPr>
+              <a:t>em</a:t>
+            </a:r>
+            <a:r>
+              <a:rPr lang="en-US" dirty="0">
+                <a:solidFill>
+                  <a:schemeClr val="bg1"/>
+                </a:solidFill>
+                <a:latin typeface="Consolas"/>
+              </a:rPr>
+              <a:t> </a:t>
+            </a:r>
+            <a:r>
+              <a:rPr lang="en-US" dirty="0" err="1">
+                <a:solidFill>
+                  <a:schemeClr val="bg1"/>
+                </a:solidFill>
+                <a:latin typeface="Consolas"/>
+              </a:rPr>
+              <a:t>fevereiro</a:t>
+            </a:r>
+            <a:r>
+              <a:rPr lang="en-US" dirty="0">
+                <a:solidFill>
+                  <a:schemeClr val="bg1"/>
+                </a:solidFill>
+                <a:latin typeface="Consolas"/>
+              </a:rPr>
+              <a:t>')</a:t>
             </a:r>
           </a:p>
           <a:p>
@@ -42442,10 +42578,10 @@
           <a:lstStyle/>
           <a:p>
             <a:r>
-              <a:rPr lang="en-US" b="1"/>
-              <a:t>When displaying a string that contains numbers you must convert the numbers into strings</a:t>
+              <a:rPr lang="pt-BR" b="1" dirty="0"/>
+              <a:t>Ao exibir uma string que contém números, você deve convertê-los em strings</a:t>
             </a:r>
-            <a:endParaRPr lang="en-US"/>
+            <a:endParaRPr lang="en-US" dirty="0"/>
           </a:p>
         </p:txBody>
       </p:sp>
@@ -42528,7 +42664,61 @@
                 </a:solidFill>
                 <a:latin typeface="Consolas"/>
               </a:rPr>
-              <a:t>' days in February'</a:t>
+              <a:t>' </a:t>
+            </a:r>
+            <a:r>
+              <a:rPr lang="en-US" dirty="0" err="1">
+                <a:solidFill>
+                  <a:srgbClr val="C00000"/>
+                </a:solidFill>
+                <a:latin typeface="Consolas"/>
+              </a:rPr>
+              <a:t>dias</a:t>
+            </a:r>
+            <a:r>
+              <a:rPr lang="en-US" dirty="0">
+                <a:solidFill>
+                  <a:srgbClr val="C00000"/>
+                </a:solidFill>
+                <a:latin typeface="Consolas"/>
+              </a:rPr>
+              <a:t> </a:t>
+            </a:r>
+            <a:r>
+              <a:rPr lang="en-US" dirty="0" err="1">
+                <a:solidFill>
+                  <a:srgbClr val="C00000"/>
+                </a:solidFill>
+                <a:latin typeface="Consolas"/>
+              </a:rPr>
+              <a:t>em</a:t>
+            </a:r>
+            <a:r>
+              <a:rPr lang="en-US" dirty="0">
+                <a:solidFill>
+                  <a:srgbClr val="C00000"/>
+                </a:solidFill>
+                <a:latin typeface="Consolas"/>
+              </a:rPr>
+              <a:t> </a:t>
+            </a:r>
+            <a:r>
+              <a:rPr lang="en-US" dirty="0" err="1">
+                <a:solidFill>
+                  <a:srgbClr val="C00000"/>
+                </a:solidFill>
+                <a:latin typeface="Consolas"/>
+              </a:rPr>
+              <a:t>fevereiro</a:t>
+            </a:r>
+            <a:r>
+              <a:rPr lang="en-US" dirty="0">
+                <a:solidFill>
+                  <a:srgbClr val="C00000"/>
+                </a:solidFill>
+                <a:latin typeface="Consolas"/>
+              </a:rPr>
+              <a:t>'</a:t>
             </a:r>
             <a:r>
               <a:rPr lang="en-US" dirty="0">
@@ -42568,7 +42758,7 @@
         <p:spPr>
           <a:xfrm>
             <a:off x="365760" y="4435164"/>
-            <a:ext cx="11704320" cy="2188291"/>
+            <a:ext cx="11704320" cy="1668149"/>
           </a:xfrm>
           <a:prstGeom prst="rect">
             <a:avLst/>
@@ -42805,30 +42995,68 @@
           </a:lstStyle>
           <a:p>
             <a:r>
-              <a:rPr lang="en-US">
+              <a:rPr lang="en-US" dirty="0">
                 <a:solidFill>
                   <a:schemeClr val="bg1"/>
                 </a:solidFill>
               </a:rPr>
-              <a:t>28 days in February</a:t>
+              <a:t>28 </a:t>
             </a:r>
-          </a:p>
-          <a:p>
-            <a:endParaRPr lang="en-US">
+            <a:r>
+              <a:rPr lang="en-US" dirty="0" err="1">
+                <a:solidFill>
+                  <a:schemeClr val="bg1"/>
+                </a:solidFill>
+              </a:rPr>
+              <a:t>dias</a:t>
+            </a:r>
+            <a:r>
+              <a:rPr lang="en-US" dirty="0">
+                <a:solidFill>
+                  <a:schemeClr val="bg1"/>
+                </a:solidFill>
+              </a:rPr>
+              <a:t> </a:t>
+            </a:r>
+            <a:r>
+              <a:rPr lang="en-US" dirty="0" err="1">
+                <a:solidFill>
+                  <a:schemeClr val="bg1"/>
+                </a:solidFill>
+              </a:rPr>
+              <a:t>em</a:t>
+            </a:r>
+            <a:r>
+              <a:rPr lang="en-US" dirty="0">
+                <a:solidFill>
+                  <a:schemeClr val="bg1"/>
+                </a:solidFill>
+              </a:rPr>
+              <a:t> </a:t>
+            </a:r>
+            <a:r>
+              <a:rPr lang="en-US" dirty="0" err="1">
+                <a:solidFill>
+                  <a:schemeClr val="bg1"/>
+                </a:solidFill>
+              </a:rPr>
+              <a:t>fevereiro</a:t>
+            </a:r>
+            <a:endParaRPr lang="en-US" dirty="0">
               <a:solidFill>
                 <a:schemeClr val="bg1"/>
               </a:solidFill>
             </a:endParaRPr>
           </a:p>
           <a:p>
-            <a:endParaRPr lang="en-US">
+            <a:endParaRPr lang="en-US" dirty="0">
               <a:solidFill>
                 <a:schemeClr val="bg1"/>
               </a:solidFill>
             </a:endParaRPr>
           </a:p>
           <a:p>
-            <a:endParaRPr lang="en-CA"/>
+            <a:endParaRPr lang="en-CA" dirty="0"/>
           </a:p>
         </p:txBody>
       </p:sp>
@@ -42960,8 +43188,8 @@
         </p:nvSpPr>
         <p:spPr>
           <a:xfrm>
-            <a:off x="365759" y="365760"/>
-            <a:ext cx="12070715" cy="914400"/>
+            <a:off x="365759" y="365759"/>
+            <a:ext cx="11704321" cy="2088073"/>
           </a:xfrm>
         </p:spPr>
         <p:txBody>
@@ -42969,17 +43197,105 @@
           <a:lstStyle/>
           <a:p>
             <a:r>
-              <a:rPr lang="en-US" b="1"/>
-              <a:t>Numbers can be stored as strings</a:t>
+              <a:rPr lang="en-US" sz="4000" b="1" dirty="0" err="1"/>
+              <a:t>Os</a:t>
+            </a:r>
+            <a:r>
+              <a:rPr lang="en-US" sz="4000" b="1" dirty="0"/>
+              <a:t> </a:t>
+            </a:r>
+            <a:r>
+              <a:rPr lang="en-US" sz="4000" b="1" dirty="0" err="1"/>
+              <a:t>números</a:t>
+            </a:r>
+            <a:r>
+              <a:rPr lang="en-US" sz="4000" b="1" dirty="0"/>
+              <a:t> </a:t>
+            </a:r>
+            <a:r>
+              <a:rPr lang="en-US" sz="4000" b="1" dirty="0" err="1"/>
+              <a:t>podem</a:t>
+            </a:r>
+            <a:r>
+              <a:rPr lang="en-US" sz="4000" b="1" dirty="0"/>
+              <a:t> ser </a:t>
+            </a:r>
+            <a:r>
+              <a:rPr lang="en-US" sz="4000" b="1" dirty="0" err="1"/>
+              <a:t>armazenados</a:t>
+            </a:r>
+            <a:r>
+              <a:rPr lang="en-US" sz="4000" b="1" dirty="0"/>
+              <a:t> </a:t>
+            </a:r>
+            <a:r>
+              <a:rPr lang="en-US" sz="4000" b="1" dirty="0" err="1"/>
+              <a:t>como</a:t>
+            </a:r>
+            <a:r>
+              <a:rPr lang="en-US" sz="4000" b="1" dirty="0"/>
+              <a:t> strings</a:t>
             </a:r>
             <a:br>
-              <a:rPr lang="en-US" b="1"/>
+              <a:rPr lang="en-US" sz="4000" b="1" dirty="0"/>
             </a:br>
             <a:r>
-              <a:rPr lang="en-US" b="1"/>
-              <a:t>Numbers stored as strings are treated as strings</a:t>
+              <a:rPr lang="en-US" sz="4000" b="1" dirty="0" err="1"/>
+              <a:t>Os</a:t>
             </a:r>
-            <a:endParaRPr lang="en-US"/>
+            <a:r>
+              <a:rPr lang="en-US" sz="4000" b="1" dirty="0"/>
+              <a:t> </a:t>
+            </a:r>
+            <a:r>
+              <a:rPr lang="en-US" sz="4000" b="1" dirty="0" err="1"/>
+              <a:t>números</a:t>
+            </a:r>
+            <a:r>
+              <a:rPr lang="en-US" sz="4000" b="1" dirty="0"/>
+              <a:t> </a:t>
+            </a:r>
+            <a:r>
+              <a:rPr lang="en-US" sz="4000" b="1" dirty="0" err="1"/>
+              <a:t>armazenados</a:t>
+            </a:r>
+            <a:r>
+              <a:rPr lang="en-US" sz="4000" b="1" dirty="0"/>
+              <a:t> </a:t>
+            </a:r>
+            <a:r>
+              <a:rPr lang="en-US" sz="4000" b="1" dirty="0" err="1"/>
+              <a:t>como</a:t>
+            </a:r>
+            <a:r>
+              <a:rPr lang="en-US" sz="4000" b="1" dirty="0"/>
+              <a:t> strings </a:t>
+            </a:r>
+            <a:r>
+              <a:rPr lang="en-US" sz="4000" b="1" dirty="0" err="1"/>
+              <a:t>são</a:t>
+            </a:r>
+            <a:r>
+              <a:rPr lang="en-US" sz="4000" b="1" dirty="0"/>
+              <a:t> </a:t>
+            </a:r>
+            <a:r>
+              <a:rPr lang="en-US" sz="4000" b="1" dirty="0" err="1"/>
+              <a:t>tratados</a:t>
+            </a:r>
+            <a:r>
+              <a:rPr lang="en-US" sz="4000" b="1" dirty="0"/>
+              <a:t> </a:t>
+            </a:r>
+            <a:r>
+              <a:rPr lang="en-US" sz="4000" b="1" dirty="0" err="1"/>
+              <a:t>como</a:t>
+            </a:r>
+            <a:r>
+              <a:rPr lang="en-US" sz="4000" b="1" dirty="0"/>
+              <a:t> strings</a:t>
+            </a:r>
+            <a:endParaRPr lang="en-US" sz="4000" dirty="0"/>
           </a:p>
         </p:txBody>
       </p:sp>
@@ -43481,10 +43797,10 @@
           <a:lstStyle/>
           <a:p>
             <a:r>
-              <a:rPr lang="en-US" b="1"/>
-              <a:t>The input function always returns strings</a:t>
+              <a:rPr lang="pt-BR" b="1" dirty="0"/>
+              <a:t>A função de entrada sempre retorna strings</a:t>
             </a:r>
-            <a:endParaRPr lang="en-US"/>
+            <a:endParaRPr lang="en-US" dirty="0"/>
           </a:p>
         </p:txBody>
       </p:sp>
@@ -43534,7 +43850,55 @@
                   <a:srgbClr val="C00000"/>
                 </a:solidFill>
               </a:rPr>
-              <a:t>'Enter first number '</a:t>
+              <a:t>'</a:t>
+            </a:r>
+            <a:r>
+              <a:rPr lang="en-CA" dirty="0" err="1">
+                <a:solidFill>
+                  <a:srgbClr val="C00000"/>
+                </a:solidFill>
+              </a:rPr>
+              <a:t>Digite</a:t>
+            </a:r>
+            <a:r>
+              <a:rPr lang="en-CA" dirty="0">
+                <a:solidFill>
+                  <a:srgbClr val="C00000"/>
+                </a:solidFill>
+              </a:rPr>
+              <a:t> o </a:t>
+            </a:r>
+            <a:r>
+              <a:rPr lang="en-CA" dirty="0" err="1">
+                <a:solidFill>
+                  <a:srgbClr val="C00000"/>
+                </a:solidFill>
+              </a:rPr>
+              <a:t>primeiro</a:t>
+            </a:r>
+            <a:r>
+              <a:rPr lang="en-CA" dirty="0">
+                <a:solidFill>
+                  <a:srgbClr val="C00000"/>
+                </a:solidFill>
+              </a:rPr>
+              <a:t> </a:t>
+            </a:r>
+            <a:r>
+              <a:rPr lang="en-CA" dirty="0" err="1">
+                <a:solidFill>
+                  <a:srgbClr val="C00000"/>
+                </a:solidFill>
+              </a:rPr>
+              <a:t>número</a:t>
+            </a:r>
+            <a:r>
+              <a:rPr lang="en-CA" dirty="0">
+                <a:solidFill>
+                  <a:srgbClr val="C00000"/>
+                </a:solidFill>
+              </a:rPr>
+              <a:t> '</a:t>
             </a:r>
             <a:r>
               <a:rPr lang="en-CA" dirty="0">
@@ -43572,7 +43936,55 @@
                   <a:srgbClr val="C00000"/>
                 </a:solidFill>
               </a:rPr>
-              <a:t>'Enter second number '</a:t>
+              <a:t>'</a:t>
+            </a:r>
+            <a:r>
+              <a:rPr lang="en-CA" dirty="0" err="1">
+                <a:solidFill>
+                  <a:srgbClr val="C00000"/>
+                </a:solidFill>
+              </a:rPr>
+              <a:t>Digite</a:t>
+            </a:r>
+            <a:r>
+              <a:rPr lang="en-CA" dirty="0">
+                <a:solidFill>
+                  <a:srgbClr val="C00000"/>
+                </a:solidFill>
+              </a:rPr>
+              <a:t> o </a:t>
+            </a:r>
+            <a:r>
+              <a:rPr lang="en-CA" dirty="0" err="1">
+                <a:solidFill>
+                  <a:srgbClr val="C00000"/>
+                </a:solidFill>
+              </a:rPr>
+              <a:t>segundo</a:t>
+            </a:r>
+            <a:r>
+              <a:rPr lang="en-CA" dirty="0">
+                <a:solidFill>
+                  <a:srgbClr val="C00000"/>
+                </a:solidFill>
+              </a:rPr>
+              <a:t> </a:t>
+            </a:r>
+            <a:r>
+              <a:rPr lang="en-CA" dirty="0" err="1">
+                <a:solidFill>
+                  <a:srgbClr val="C00000"/>
+                </a:solidFill>
+              </a:rPr>
+              <a:t>número</a:t>
+            </a:r>
+            <a:r>
+              <a:rPr lang="en-CA" dirty="0">
+                <a:solidFill>
+                  <a:srgbClr val="C00000"/>
+                </a:solidFill>
+              </a:rPr>
+              <a:t> '</a:t>
             </a:r>
             <a:r>
               <a:rPr lang="en-CA" dirty="0">
@@ -43867,22 +44279,102 @@
           </a:lstStyle>
           <a:p>
             <a:r>
-              <a:rPr lang="en-US" dirty="0">
+              <a:rPr lang="en-US" dirty="0" err="1">
                 <a:solidFill>
                   <a:schemeClr val="bg1"/>
                 </a:solidFill>
               </a:rPr>
-              <a:t>Enter first number 5</a:t>
+              <a:t>Digite</a:t>
             </a:r>
-          </a:p>
-          <a:p>
             <a:r>
               <a:rPr lang="en-US" dirty="0">
                 <a:solidFill>
                   <a:schemeClr val="bg1"/>
                 </a:solidFill>
               </a:rPr>
-              <a:t>Enter second number 6</a:t>
+              <a:t> o </a:t>
+            </a:r>
+            <a:r>
+              <a:rPr lang="en-US" dirty="0" err="1">
+                <a:solidFill>
+                  <a:schemeClr val="bg1"/>
+                </a:solidFill>
+              </a:rPr>
+              <a:t>primeiro</a:t>
+            </a:r>
+            <a:r>
+              <a:rPr lang="en-US" dirty="0">
+                <a:solidFill>
+                  <a:schemeClr val="bg1"/>
+                </a:solidFill>
+              </a:rPr>
+              <a:t> </a:t>
+            </a:r>
+            <a:r>
+              <a:rPr lang="en-US" dirty="0" err="1">
+                <a:solidFill>
+                  <a:schemeClr val="bg1"/>
+                </a:solidFill>
+              </a:rPr>
+              <a:t>número</a:t>
+            </a:r>
+            <a:r>
+              <a:rPr lang="en-US" dirty="0">
+                <a:solidFill>
+                  <a:schemeClr val="bg1"/>
+                </a:solidFill>
+              </a:rPr>
+              <a:t> 5</a:t>
+            </a:r>
+          </a:p>
+          <a:p>
+            <a:r>
+              <a:rPr lang="en-US" dirty="0" err="1">
+                <a:solidFill>
+                  <a:schemeClr val="bg1"/>
+                </a:solidFill>
+              </a:rPr>
+              <a:t>Digite</a:t>
+            </a:r>
+            <a:r>
+              <a:rPr lang="en-US" dirty="0">
+                <a:solidFill>
+                  <a:schemeClr val="bg1"/>
+                </a:solidFill>
+              </a:rPr>
+              <a:t> o </a:t>
+            </a:r>
+            <a:r>
+              <a:rPr lang="en-US" dirty="0" err="1">
+                <a:solidFill>
+                  <a:schemeClr val="bg1"/>
+                </a:solidFill>
+              </a:rPr>
+              <a:t>segundo</a:t>
+            </a:r>
+            <a:r>
+              <a:rPr lang="en-US" dirty="0">
+                <a:solidFill>
+                  <a:schemeClr val="bg1"/>
+                </a:solidFill>
+              </a:rPr>
+              <a:t> </a:t>
+            </a:r>
+            <a:r>
+              <a:rPr lang="en-US" dirty="0" err="1">
+                <a:solidFill>
+                  <a:schemeClr val="bg1"/>
+                </a:solidFill>
+              </a:rPr>
+              <a:t>número</a:t>
+            </a:r>
+            <a:r>
+              <a:rPr lang="en-US" dirty="0">
+                <a:solidFill>
+                  <a:schemeClr val="bg1"/>
+                </a:solidFill>
+              </a:rPr>
+              <a:t> 6</a:t>
             </a:r>
           </a:p>
           <a:p>
@@ -43961,10 +44453,10 @@
           <a:lstStyle/>
           <a:p>
             <a:r>
-              <a:rPr lang="en-US" b="1"/>
-              <a:t>Numbers stored as strings must be converted to numeric values before doing math</a:t>
+              <a:rPr lang="pt-BR" sz="4000" b="1" dirty="0"/>
+              <a:t>Os números armazenados como strings devem ser convertidos em valores numéricos antes de fazer contas</a:t>
             </a:r>
-            <a:endParaRPr lang="en-US"/>
+            <a:endParaRPr lang="en-US" sz="4000" dirty="0"/>
           </a:p>
         </p:txBody>
       </p:sp>
@@ -44002,7 +44494,55 @@
                   <a:srgbClr val="C00000"/>
                 </a:solidFill>
               </a:rPr>
-              <a:t>'Enter first number '</a:t>
+              <a:t>'</a:t>
+            </a:r>
+            <a:r>
+              <a:rPr lang="en-CA" dirty="0" err="1">
+                <a:solidFill>
+                  <a:srgbClr val="C00000"/>
+                </a:solidFill>
+              </a:rPr>
+              <a:t>Digite</a:t>
+            </a:r>
+            <a:r>
+              <a:rPr lang="en-CA" dirty="0">
+                <a:solidFill>
+                  <a:srgbClr val="C00000"/>
+                </a:solidFill>
+              </a:rPr>
+              <a:t> o </a:t>
+            </a:r>
+            <a:r>
+              <a:rPr lang="en-CA" dirty="0" err="1">
+                <a:solidFill>
+                  <a:srgbClr val="C00000"/>
+                </a:solidFill>
+              </a:rPr>
+              <a:t>primeiro</a:t>
+            </a:r>
+            <a:r>
+              <a:rPr lang="en-CA" dirty="0">
+                <a:solidFill>
+                  <a:srgbClr val="C00000"/>
+                </a:solidFill>
+              </a:rPr>
+              <a:t> </a:t>
+            </a:r>
+            <a:r>
+              <a:rPr lang="en-CA" dirty="0" err="1">
+                <a:solidFill>
+                  <a:srgbClr val="C00000"/>
+                </a:solidFill>
+              </a:rPr>
+              <a:t>número</a:t>
+            </a:r>
+            <a:r>
+              <a:rPr lang="en-CA" dirty="0">
+                <a:solidFill>
+                  <a:srgbClr val="C00000"/>
+                </a:solidFill>
+              </a:rPr>
+              <a:t> '</a:t>
             </a:r>
             <a:r>
               <a:rPr lang="en-CA" dirty="0"/>
@@ -44024,7 +44564,55 @@
                   <a:srgbClr val="C00000"/>
                 </a:solidFill>
               </a:rPr>
-              <a:t>'Enter second number '</a:t>
+              <a:t>'</a:t>
+            </a:r>
+            <a:r>
+              <a:rPr lang="en-CA" dirty="0" err="1">
+                <a:solidFill>
+                  <a:srgbClr val="C00000"/>
+                </a:solidFill>
+              </a:rPr>
+              <a:t>Digite</a:t>
+            </a:r>
+            <a:r>
+              <a:rPr lang="en-CA" dirty="0">
+                <a:solidFill>
+                  <a:srgbClr val="C00000"/>
+                </a:solidFill>
+              </a:rPr>
+              <a:t> o </a:t>
+            </a:r>
+            <a:r>
+              <a:rPr lang="en-CA" dirty="0" err="1">
+                <a:solidFill>
+                  <a:srgbClr val="C00000"/>
+                </a:solidFill>
+              </a:rPr>
+              <a:t>segundo</a:t>
+            </a:r>
+            <a:r>
+              <a:rPr lang="en-CA" dirty="0">
+                <a:solidFill>
+                  <a:srgbClr val="C00000"/>
+                </a:solidFill>
+              </a:rPr>
+              <a:t> </a:t>
+            </a:r>
+            <a:r>
+              <a:rPr lang="en-CA" dirty="0" err="1">
+                <a:solidFill>
+                  <a:srgbClr val="C00000"/>
+                </a:solidFill>
+              </a:rPr>
+              <a:t>número</a:t>
+            </a:r>
+            <a:r>
+              <a:rPr lang="en-CA" dirty="0">
+                <a:solidFill>
+                  <a:srgbClr val="C00000"/>
+                </a:solidFill>
+              </a:rPr>
+              <a:t> '</a:t>
             </a:r>
             <a:r>
               <a:rPr lang="en-CA" dirty="0">
@@ -44392,22 +44980,102 @@
           </a:lstStyle>
           <a:p>
             <a:r>
-              <a:rPr lang="en-US" dirty="0">
+              <a:rPr lang="en-US" dirty="0" err="1">
                 <a:solidFill>
                   <a:schemeClr val="bg1"/>
                 </a:solidFill>
               </a:rPr>
-              <a:t>Enter first number 5</a:t>
+              <a:t>Digite</a:t>
             </a:r>
-          </a:p>
-          <a:p>
             <a:r>
               <a:rPr lang="en-US" dirty="0">
                 <a:solidFill>
                   <a:schemeClr val="bg1"/>
                 </a:solidFill>
               </a:rPr>
-              <a:t>Enter second number 6</a:t>
+              <a:t> o </a:t>
+            </a:r>
+            <a:r>
+              <a:rPr lang="en-US" dirty="0" err="1">
+                <a:solidFill>
+                  <a:schemeClr val="bg1"/>
+                </a:solidFill>
+              </a:rPr>
+              <a:t>primeiro</a:t>
+            </a:r>
+            <a:r>
+              <a:rPr lang="en-US" dirty="0">
+                <a:solidFill>
+                  <a:schemeClr val="bg1"/>
+                </a:solidFill>
+              </a:rPr>
+              <a:t> </a:t>
+            </a:r>
+            <a:r>
+              <a:rPr lang="en-US" dirty="0" err="1">
+                <a:solidFill>
+                  <a:schemeClr val="bg1"/>
+                </a:solidFill>
+              </a:rPr>
+              <a:t>número</a:t>
+            </a:r>
+            <a:r>
+              <a:rPr lang="en-US" dirty="0">
+                <a:solidFill>
+                  <a:schemeClr val="bg1"/>
+                </a:solidFill>
+              </a:rPr>
+              <a:t> 5</a:t>
+            </a:r>
+          </a:p>
+          <a:p>
+            <a:r>
+              <a:rPr lang="en-US" dirty="0" err="1">
+                <a:solidFill>
+                  <a:schemeClr val="bg1"/>
+                </a:solidFill>
+              </a:rPr>
+              <a:t>Digite</a:t>
+            </a:r>
+            <a:r>
+              <a:rPr lang="en-US" dirty="0">
+                <a:solidFill>
+                  <a:schemeClr val="bg1"/>
+                </a:solidFill>
+              </a:rPr>
+              <a:t> o </a:t>
+            </a:r>
+            <a:r>
+              <a:rPr lang="en-US" dirty="0" err="1">
+                <a:solidFill>
+                  <a:schemeClr val="bg1"/>
+                </a:solidFill>
+              </a:rPr>
+              <a:t>segundo</a:t>
+            </a:r>
+            <a:r>
+              <a:rPr lang="en-US" dirty="0">
+                <a:solidFill>
+                  <a:schemeClr val="bg1"/>
+                </a:solidFill>
+              </a:rPr>
+              <a:t> </a:t>
+            </a:r>
+            <a:r>
+              <a:rPr lang="en-US" dirty="0" err="1">
+                <a:solidFill>
+                  <a:schemeClr val="bg1"/>
+                </a:solidFill>
+              </a:rPr>
+              <a:t>número</a:t>
+            </a:r>
+            <a:r>
+              <a:rPr lang="en-US" dirty="0">
+                <a:solidFill>
+                  <a:schemeClr val="bg1"/>
+                </a:solidFill>
+              </a:rPr>
+              <a:t> 6</a:t>
             </a:r>
           </a:p>
           <a:p>
@@ -44487,10 +45155,10 @@
           <a:lstStyle/>
           <a:p>
             <a:r>
-              <a:rPr lang="en-US" b="1"/>
-              <a:t>Numeric values are used for math operations and to specify individual rows in lists and arrays</a:t>
+              <a:rPr lang="pt-BR" sz="4400" b="1" dirty="0"/>
+              <a:t>Os valores numéricos são usados para operações matemáticas e para especificar linhas individuais em lists e arrays</a:t>
             </a:r>
-            <a:endParaRPr lang="en-US"/>
+            <a:endParaRPr lang="en-US" sz="4400" dirty="0"/>
           </a:p>
         </p:txBody>
       </p:sp>
@@ -44514,25 +45182,25 @@
           <a:bodyPr/>
           <a:lstStyle/>
           <a:p>
-            <a:endParaRPr lang="en-CA"/>
+            <a:endParaRPr lang="en-CA" dirty="0"/>
           </a:p>
           <a:p>
-            <a:endParaRPr lang="en-CA"/>
+            <a:endParaRPr lang="en-CA" dirty="0"/>
           </a:p>
           <a:p>
             <a:r>
-              <a:rPr lang="en-CA" err="1"/>
+              <a:rPr lang="en-CA" dirty="0" err="1"/>
               <a:t>price_with_tax</a:t>
             </a:r>
             <a:r>
-              <a:rPr lang="en-CA"/>
+              <a:rPr lang="en-CA" dirty="0"/>
               <a:t> = price + price * </a:t>
             </a:r>
             <a:r>
-              <a:rPr lang="en-CA" err="1"/>
+              <a:rPr lang="en-CA" dirty="0" err="1"/>
               <a:t>federal_tax</a:t>
             </a:r>
-            <a:endParaRPr lang="en-CA"/>
+            <a:endParaRPr lang="en-CA" dirty="0"/>
           </a:p>
         </p:txBody>
       </p:sp>
@@ -44551,7 +45219,7 @@
           <p:nvPr>
             <p:extLst>
               <p:ext uri="{D42A27DB-BD31-4B8C-83A1-F6EECF244321}">
-                <p14:modId xmlns:p14="http://schemas.microsoft.com/office/powerpoint/2010/main" val="1501809234"/>
+                <p14:modId xmlns:p14="http://schemas.microsoft.com/office/powerpoint/2010/main" val="4216172871"/>
               </p:ext>
             </p:extLst>
           </p:nvPr>
@@ -44602,9 +45270,14 @@
                     <a:lstStyle/>
                     <a:p>
                       <a:r>
-                        <a:rPr lang="en-CA"/>
-                        <a:t>module name</a:t>
+                        <a:rPr lang="en-CA" dirty="0"/>
+                        <a:t>Nome do </a:t>
                       </a:r>
+                      <a:r>
+                        <a:rPr lang="en-CA" dirty="0" err="1"/>
+                        <a:t>módulo</a:t>
+                      </a:r>
+                      <a:endParaRPr lang="en-CA" dirty="0"/>
                     </a:p>
                   </a:txBody>
                   <a:tcPr/>
@@ -44800,7 +45473,7 @@
                     <a:lstStyle/>
                     <a:p>
                       <a:r>
-                        <a:rPr lang="en-CA"/>
+                        <a:rPr lang="en-CA" dirty="0"/>
                         <a:t>Training your model</a:t>
                       </a:r>
                     </a:p>
@@ -45149,22 +45822,22 @@
             </a:lvl9pPr>
           </a:lstStyle>
           <a:p>
-            <a:endParaRPr lang="en-CA"/>
+            <a:endParaRPr lang="en-CA" dirty="0"/>
           </a:p>
           <a:p>
-            <a:endParaRPr lang="en-CA"/>
+            <a:endParaRPr lang="en-CA" dirty="0"/>
           </a:p>
           <a:p>
             <a:r>
-              <a:rPr lang="en-CA"/>
+              <a:rPr lang="en-CA" dirty="0"/>
               <a:t>module(</a:t>
             </a:r>
             <a:r>
-              <a:rPr lang="en-CA" err="1"/>
+              <a:rPr lang="en-CA" dirty="0" err="1"/>
               <a:t>current_module</a:t>
             </a:r>
             <a:r>
-              <a:rPr lang="en-CA"/>
+              <a:rPr lang="en-CA" dirty="0"/>
               <a:t>)</a:t>
             </a:r>
           </a:p>
@@ -46294,6 +46967,18 @@
 </file>
 
 <file path=customXml/item1.xml><?xml version="1.0" encoding="utf-8"?>
+<Control xmlns="http://schemas.microsoft.com/VisualStudio/2011/storyboarding/control">
+  <Id Name="a53d73d2-368b-429e-b817-1324eec1382c" Revision="1" Stencil="7276b9ef-3953-4dce-a89b-ed85f20b8b93" StencilVersion="1.0"/>
+</Control>
+</file>
+
+<file path=customXml/item10.xml><?xml version="1.0" encoding="utf-8"?>
+<Control xmlns="http://schemas.microsoft.com/VisualStudio/2011/storyboarding/control">
+  <Id Name="d69996e1-3d61-4686-9b63-f1b855c596ab" Revision="1" Stencil="7276b9ef-3953-4dce-a89b-ed85f20b8b93" StencilVersion="1.0"/>
+</Control>
+</file>
+
+<file path=customXml/item11.xml><?xml version="1.0" encoding="utf-8"?>
 <p:properties xmlns:p="http://schemas.microsoft.com/office/2006/metadata/properties" xmlns:xsi="http://www.w3.org/2001/XMLSchema-instance" xmlns:pc="http://schemas.microsoft.com/office/infopath/2007/PartnerControls">
   <documentManagement>
     <SharedWithUsers xmlns="83cd2334-221a-48c3-9034-bfd1542dfe28">
@@ -46317,19 +47002,28 @@
 </p:properties>
 </file>
 
-<file path=customXml/item10.xml><?xml version="1.0" encoding="utf-8"?>
-<Control xmlns="http://schemas.microsoft.com/VisualStudio/2011/storyboarding/control">
-  <Id Name="369f9055-6b6c-48b9-9320-5df2d46c430a" Revision="1" Stencil="7276b9ef-3953-4dce-a89b-ed85f20b8b93" StencilVersion="1.0"/>
-</Control>
+<file path=customXml/item12.xml><?xml version="1.0" encoding="utf-8"?>
+<?mso-contentType ?>
+<FormTemplates xmlns="http://schemas.microsoft.com/sharepoint/v3/contenttype/forms">
+  <Display>DocumentLibraryForm</Display>
+  <Edit>DocumentLibraryForm</Edit>
+  <New>DocumentLibraryForm</New>
+</FormTemplates>
 </file>
 
-<file path=customXml/item11.xml><?xml version="1.0" encoding="utf-8"?>
+<file path=customXml/item13.xml><?xml version="1.0" encoding="utf-8"?>
 <Control xmlns="http://schemas.microsoft.com/VisualStudio/2011/storyboarding/control">
   <Id Name="d69996e1-3d61-4686-9b63-f1b855c596ab" Revision="1" Stencil="7276b9ef-3953-4dce-a89b-ed85f20b8b93" StencilVersion="1.0"/>
 </Control>
 </file>
 
-<file path=customXml/item12.xml><?xml version="1.0" encoding="utf-8"?>
+<file path=customXml/item14.xml><?xml version="1.0" encoding="utf-8"?>
+<Control xmlns="http://schemas.microsoft.com/VisualStudio/2011/storyboarding/control">
+  <Id Name="a2191c86-fc50-4add-948c-129f6b5a88d8" Revision="1" Stencil="7276b9ef-3953-4dce-a89b-ed85f20b8b93" StencilVersion="1.0"/>
+</Control>
+</file>
+
+<file path=customXml/item15.xml><?xml version="1.0" encoding="utf-8"?>
 <p:properties xmlns:p="http://schemas.microsoft.com/office/2006/metadata/properties" xmlns:xsi="http://www.w3.org/2001/XMLSchema-instance" xmlns:pc="http://schemas.microsoft.com/office/infopath/2007/PartnerControls">
   <documentManagement>
     <SharedWithUsers xmlns="83cd2334-221a-48c3-9034-bfd1542dfe28">
@@ -46353,319 +47047,19 @@
 </p:properties>
 </file>
 
-<file path=customXml/item13.xml><?xml version="1.0" encoding="utf-8"?>
-<?mso-contentType ?>
-<FormTemplates xmlns="http://schemas.microsoft.com/sharepoint/v3/contenttype/forms">
-  <Display>DocumentLibraryForm</Display>
-  <Edit>DocumentLibraryForm</Edit>
-  <New>DocumentLibraryForm</New>
-</FormTemplates>
+<file path=customXml/item16.xml><?xml version="1.0" encoding="utf-8"?>
+<Control xmlns="http://schemas.microsoft.com/VisualStudio/2011/storyboarding/control">
+  <Id Name="a2191c86-fc50-4add-948c-129f6b5a88d8" Revision="1" Stencil="7276b9ef-3953-4dce-a89b-ed85f20b8b93" StencilVersion="1.0"/>
+</Control>
 </file>
 
-<file path=customXml/item14.xml><?xml version="1.0" encoding="utf-8"?>
-<?mso-contentType ?>
-<FormTemplates xmlns="http://schemas.microsoft.com/sharepoint/v3/contenttype/forms">
-  <Display>DocumentLibraryForm</Display>
-  <Edit>DocumentLibraryForm</Edit>
-  <New>DocumentLibraryForm</New>
-</FormTemplates>
-</file>
-
-<file path=customXml/item15.xml><?xml version="1.0" encoding="utf-8"?>
-<?mso-contentType ?>
-<FormTemplates xmlns="http://schemas.microsoft.com/sharepoint/v3/contenttype/forms">
-  <Display>DocumentLibraryForm</Display>
-  <Edit>DocumentLibraryForm</Edit>
-  <New>DocumentLibraryForm</New>
-</FormTemplates>
-</file>
-
-<file path=customXml/item16.xml><?xml version="1.0" encoding="utf-8"?>
+<file path=customXml/item17.xml><?xml version="1.0" encoding="utf-8"?>
 <Control xmlns="http://schemas.microsoft.com/VisualStudio/2011/storyboarding/control">
   <Id Name="fb22c541-ded0-47fa-8877-83a4c2d16227" Revision="1" Stencil="7276b9ef-3953-4dce-a89b-ed85f20b8b93" StencilVersion="1.0"/>
 </Control>
 </file>
 
-<file path=customXml/item17.xml><?xml version="1.0" encoding="utf-8"?>
-<Control xmlns="http://schemas.microsoft.com/VisualStudio/2011/storyboarding/control">
-  <Id Name="369f9055-6b6c-48b9-9320-5df2d46c430a" Revision="1" Stencil="7276b9ef-3953-4dce-a89b-ed85f20b8b93" StencilVersion="1.0"/>
-</Control>
-</file>
-
 <file path=customXml/item18.xml><?xml version="1.0" encoding="utf-8"?>
-<Control xmlns="http://schemas.microsoft.com/VisualStudio/2011/storyboarding/control">
-  <Id Name="a53d73d2-368b-429e-b817-1324eec1382c" Revision="1" Stencil="7276b9ef-3953-4dce-a89b-ed85f20b8b93" StencilVersion="1.0"/>
-</Control>
-</file>
-
-<file path=customXml/item19.xml><?xml version="1.0" encoding="utf-8"?>
-<p:properties xmlns:p="http://schemas.microsoft.com/office/2006/metadata/properties" xmlns:xsi="http://www.w3.org/2001/XMLSchema-instance" xmlns:pc="http://schemas.microsoft.com/office/infopath/2007/PartnerControls">
-  <documentManagement>
-    <SharedWithUsers xmlns="83cd2334-221a-48c3-9034-bfd1542dfe28">
-      <UserInfo>
-        <DisplayName>Gilad Turbahn</DisplayName>
-        <AccountId>511</AccountId>
-        <AccountType/>
-      </UserInfo>
-      <UserInfo>
-        <DisplayName>Keith Boyd</DisplayName>
-        <AccountId>993</AccountId>
-        <AccountType/>
-      </UserInfo>
-      <UserInfo>
-        <DisplayName>Christopher Harrison</DisplayName>
-        <AccountId>1176</AccountId>
-        <AccountType/>
-      </UserInfo>
-    </SharedWithUsers>
-  </documentManagement>
-</p:properties>
-</file>
-
-<file path=customXml/item2.xml><?xml version="1.0" encoding="utf-8"?>
-<Control xmlns="http://schemas.microsoft.com/VisualStudio/2011/storyboarding/control">
-  <Id Name="a2191c86-fc50-4add-948c-129f6b5a88d8" Revision="1" Stencil="7276b9ef-3953-4dce-a89b-ed85f20b8b93" StencilVersion="1.0"/>
-</Control>
-</file>
-
-<file path=customXml/item20.xml><?xml version="1.0" encoding="utf-8"?>
-<Control xmlns="http://schemas.microsoft.com/VisualStudio/2011/storyboarding/control">
-  <Id Name="d69996e1-3d61-4686-9b63-f1b855c596ab" Revision="1" Stencil="7276b9ef-3953-4dce-a89b-ed85f20b8b93" StencilVersion="1.0"/>
-</Control>
-</file>
-
-<file path=customXml/item21.xml><?xml version="1.0" encoding="utf-8"?>
-<?mso-contentType ?>
-<FormTemplates xmlns="http://schemas.microsoft.com/sharepoint/v3/contenttype/forms">
-  <Display>DocumentLibraryForm</Display>
-  <Edit>DocumentLibraryForm</Edit>
-  <New>DocumentLibraryForm</New>
-</FormTemplates>
-</file>
-
-<file path=customXml/item22.xml><?xml version="1.0" encoding="utf-8"?>
-<Control xmlns="http://schemas.microsoft.com/VisualStudio/2011/storyboarding/control">
-  <Id Name="d69996e1-3d61-4686-9b63-f1b855c596ab" Revision="1" Stencil="7276b9ef-3953-4dce-a89b-ed85f20b8b93" StencilVersion="1.0"/>
-</Control>
-</file>
-
-<file path=customXml/item23.xml><?xml version="1.0" encoding="utf-8"?>
-<Control xmlns="http://schemas.microsoft.com/VisualStudio/2011/storyboarding/control">
-  <Id Name="fb22c541-ded0-47fa-8877-83a4c2d16227" Revision="1" Stencil="7276b9ef-3953-4dce-a89b-ed85f20b8b93" StencilVersion="1.0"/>
-</Control>
-</file>
-
-<file path=customXml/item24.xml><?xml version="1.0" encoding="utf-8"?>
-<p:properties xmlns:p="http://schemas.microsoft.com/office/2006/metadata/properties" xmlns:xsi="http://www.w3.org/2001/XMLSchema-instance" xmlns:pc="http://schemas.microsoft.com/office/infopath/2007/PartnerControls">
-  <documentManagement>
-    <SharedWithUsers xmlns="83cd2334-221a-48c3-9034-bfd1542dfe28">
-      <UserInfo>
-        <DisplayName>Gilad Turbahn</DisplayName>
-        <AccountId>511</AccountId>
-        <AccountType/>
-      </UserInfo>
-      <UserInfo>
-        <DisplayName>Keith Boyd</DisplayName>
-        <AccountId>993</AccountId>
-        <AccountType/>
-      </UserInfo>
-      <UserInfo>
-        <DisplayName>Christopher Harrison</DisplayName>
-        <AccountId>1176</AccountId>
-        <AccountType/>
-      </UserInfo>
-    </SharedWithUsers>
-  </documentManagement>
-</p:properties>
-</file>
-
-<file path=customXml/item25.xml><?xml version="1.0" encoding="utf-8"?>
-<Control xmlns="http://schemas.microsoft.com/VisualStudio/2011/storyboarding/control">
-  <Id Name="a2191c86-fc50-4add-948c-129f6b5a88d8" Revision="1" Stencil="7276b9ef-3953-4dce-a89b-ed85f20b8b93" StencilVersion="1.0"/>
-</Control>
-</file>
-
-<file path=customXml/item26.xml><?xml version="1.0" encoding="utf-8"?>
-<Control xmlns="http://schemas.microsoft.com/VisualStudio/2011/storyboarding/control">
-  <Id Name="a2191c86-fc50-4add-948c-129f6b5a88d8" Revision="1" Stencil="7276b9ef-3953-4dce-a89b-ed85f20b8b93" StencilVersion="1.0"/>
-</Control>
-</file>
-
-<file path=customXml/item27.xml><?xml version="1.0" encoding="utf-8"?>
-<Control xmlns="http://schemas.microsoft.com/VisualStudio/2011/storyboarding/control">
-  <Id Name="a2191c86-fc50-4add-948c-129f6b5a88d8" Revision="1" Stencil="7276b9ef-3953-4dce-a89b-ed85f20b8b93" StencilVersion="1.0"/>
-</Control>
-</file>
-
-<file path=customXml/item28.xml><?xml version="1.0" encoding="utf-8"?>
-<Control xmlns="http://schemas.microsoft.com/VisualStudio/2011/storyboarding/control">
-  <Id Name="369f9055-6b6c-48b9-9320-5df2d46c430a" Revision="1" Stencil="7276b9ef-3953-4dce-a89b-ed85f20b8b93" StencilVersion="1.0"/>
-</Control>
-</file>
-
-<file path=customXml/item29.xml><?xml version="1.0" encoding="utf-8"?>
-<Control xmlns="http://schemas.microsoft.com/VisualStudio/2011/storyboarding/control">
-  <Id Name="a53d73d2-368b-429e-b817-1324eec1382c" Revision="1" Stencil="7276b9ef-3953-4dce-a89b-ed85f20b8b93" StencilVersion="1.0"/>
-</Control>
-</file>
-
-<file path=customXml/item3.xml><?xml version="1.0" encoding="utf-8"?>
-<Control xmlns="http://schemas.microsoft.com/VisualStudio/2011/storyboarding/control">
-  <Id Name="369f9055-6b6c-48b9-9320-5df2d46c430a" Revision="1" Stencil="7276b9ef-3953-4dce-a89b-ed85f20b8b93" StencilVersion="1.0"/>
-</Control>
-</file>
-
-<file path=customXml/item30.xml><?xml version="1.0" encoding="utf-8"?>
-<p:properties xmlns:p="http://schemas.microsoft.com/office/2006/metadata/properties" xmlns:xsi="http://www.w3.org/2001/XMLSchema-instance" xmlns:pc="http://schemas.microsoft.com/office/infopath/2007/PartnerControls">
-  <documentManagement>
-    <SharedWithUsers xmlns="83cd2334-221a-48c3-9034-bfd1542dfe28">
-      <UserInfo>
-        <DisplayName>Gilad Turbahn</DisplayName>
-        <AccountId>511</AccountId>
-        <AccountType/>
-      </UserInfo>
-      <UserInfo>
-        <DisplayName>Keith Boyd</DisplayName>
-        <AccountId>993</AccountId>
-        <AccountType/>
-      </UserInfo>
-      <UserInfo>
-        <DisplayName>Christopher Harrison</DisplayName>
-        <AccountId>1176</AccountId>
-        <AccountType/>
-      </UserInfo>
-    </SharedWithUsers>
-  </documentManagement>
-</p:properties>
-</file>
-
-<file path=customXml/item31.xml><?xml version="1.0" encoding="utf-8"?>
-<Control xmlns="http://schemas.microsoft.com/VisualStudio/2011/storyboarding/control">
-  <Id Name="369f9055-6b6c-48b9-9320-5df2d46c430a" Revision="1" Stencil="7276b9ef-3953-4dce-a89b-ed85f20b8b93" StencilVersion="1.0"/>
-</Control>
-</file>
-
-<file path=customXml/item32.xml><?xml version="1.0" encoding="utf-8"?>
-<Control xmlns="http://schemas.microsoft.com/VisualStudio/2011/storyboarding/control">
-  <Id Name="a53d73d2-368b-429e-b817-1324eec1382c" Revision="1" Stencil="7276b9ef-3953-4dce-a89b-ed85f20b8b93" StencilVersion="1.0"/>
-</Control>
-</file>
-
-<file path=customXml/item33.xml><?xml version="1.0" encoding="utf-8"?>
-<Control xmlns="http://schemas.microsoft.com/VisualStudio/2011/storyboarding/control">
-  <Id Name="a53d73d2-368b-429e-b817-1324eec1382c" Revision="1" Stencil="7276b9ef-3953-4dce-a89b-ed85f20b8b93" StencilVersion="1.0"/>
-</Control>
-</file>
-
-<file path=customXml/item34.xml><?xml version="1.0" encoding="utf-8"?>
-<Control xmlns="http://schemas.microsoft.com/VisualStudio/2011/storyboarding/control">
-  <Id Name="d69996e1-3d61-4686-9b63-f1b855c596ab" Revision="1" Stencil="7276b9ef-3953-4dce-a89b-ed85f20b8b93" StencilVersion="1.0"/>
-</Control>
-</file>
-
-<file path=customXml/item35.xml><?xml version="1.0" encoding="utf-8"?>
-<Control xmlns="http://schemas.microsoft.com/VisualStudio/2011/storyboarding/control">
-  <Id Name="a2191c86-fc50-4add-948c-129f6b5a88d8" Revision="1" Stencil="7276b9ef-3953-4dce-a89b-ed85f20b8b93" StencilVersion="1.0"/>
-</Control>
-</file>
-
-<file path=customXml/item36.xml><?xml version="1.0" encoding="utf-8"?>
-<Control xmlns="http://schemas.microsoft.com/VisualStudio/2011/storyboarding/control">
-  <Id Name="a53d73d2-368b-429e-b817-1324eec1382c" Revision="1" Stencil="7276b9ef-3953-4dce-a89b-ed85f20b8b93" StencilVersion="1.0"/>
-</Control>
-</file>
-
-<file path=customXml/item37.xml><?xml version="1.0" encoding="utf-8"?>
-<Control xmlns="http://schemas.microsoft.com/VisualStudio/2011/storyboarding/control">
-  <Id Name="d69996e1-3d61-4686-9b63-f1b855c596ab" Revision="1" Stencil="7276b9ef-3953-4dce-a89b-ed85f20b8b93" StencilVersion="1.0"/>
-</Control>
-</file>
-
-<file path=customXml/item38.xml><?xml version="1.0" encoding="utf-8"?>
-<Control xmlns="http://schemas.microsoft.com/VisualStudio/2011/storyboarding/control">
-  <Id Name="369f9055-6b6c-48b9-9320-5df2d46c430a" Revision="1" Stencil="7276b9ef-3953-4dce-a89b-ed85f20b8b93" StencilVersion="1.0"/>
-</Control>
-</file>
-
-<file path=customXml/item39.xml><?xml version="1.0" encoding="utf-8"?>
-<?mso-contentType ?>
-<FormTemplates xmlns="http://schemas.microsoft.com/sharepoint/v3/contenttype/forms">
-  <Display>DocumentLibraryForm</Display>
-  <Edit>DocumentLibraryForm</Edit>
-  <New>DocumentLibraryForm</New>
-</FormTemplates>
-</file>
-
-<file path=customXml/item4.xml><?xml version="1.0" encoding="utf-8"?>
-<Control xmlns="http://schemas.microsoft.com/VisualStudio/2011/storyboarding/control">
-  <Id Name="fb22c541-ded0-47fa-8877-83a4c2d16227" Revision="1" Stencil="7276b9ef-3953-4dce-a89b-ed85f20b8b93" StencilVersion="1.0"/>
-</Control>
-</file>
-
-<file path=customXml/item40.xml><?xml version="1.0" encoding="utf-8"?>
-<Control xmlns="http://schemas.microsoft.com/VisualStudio/2011/storyboarding/control">
-  <Id Name="fb22c541-ded0-47fa-8877-83a4c2d16227" Revision="1" Stencil="7276b9ef-3953-4dce-a89b-ed85f20b8b93" StencilVersion="1.0"/>
-</Control>
-</file>
-
-<file path=customXml/item41.xml><?xml version="1.0" encoding="utf-8"?>
-<Control xmlns="http://schemas.microsoft.com/VisualStudio/2011/storyboarding/control">
-  <Id Name="fb22c541-ded0-47fa-8877-83a4c2d16227" Revision="1" Stencil="7276b9ef-3953-4dce-a89b-ed85f20b8b93" StencilVersion="1.0"/>
-</Control>
-</file>
-
-<file path=customXml/item42.xml><?xml version="1.0" encoding="utf-8"?>
-<?mso-contentType ?>
-<FormTemplates xmlns="http://schemas.microsoft.com/sharepoint/v3/contenttype/forms">
-  <Display>DocumentLibraryForm</Display>
-  <Edit>DocumentLibraryForm</Edit>
-  <New>DocumentLibraryForm</New>
-</FormTemplates>
-</file>
-
-<file path=customXml/item43.xml><?xml version="1.0" encoding="utf-8"?>
-<Control xmlns="http://schemas.microsoft.com/VisualStudio/2011/storyboarding/control">
-  <Id Name="fb22c541-ded0-47fa-8877-83a4c2d16227" Revision="1" Stencil="7276b9ef-3953-4dce-a89b-ed85f20b8b93" StencilVersion="1.0"/>
-</Control>
-</file>
-
-<file path=customXml/item5.xml><?xml version="1.0" encoding="utf-8"?>
-<Control xmlns="http://schemas.microsoft.com/VisualStudio/2011/storyboarding/control">
-  <Id Name="d69996e1-3d61-4686-9b63-f1b855c596ab" Revision="1" Stencil="7276b9ef-3953-4dce-a89b-ed85f20b8b93" StencilVersion="1.0"/>
-</Control>
-</file>
-
-<file path=customXml/item6.xml><?xml version="1.0" encoding="utf-8"?>
-<p:properties xmlns:p="http://schemas.microsoft.com/office/2006/metadata/properties" xmlns:xsi="http://www.w3.org/2001/XMLSchema-instance" xmlns:pc="http://schemas.microsoft.com/office/infopath/2007/PartnerControls">
-  <documentManagement>
-    <SharedWithUsers xmlns="83cd2334-221a-48c3-9034-bfd1542dfe28">
-      <UserInfo>
-        <DisplayName>Gilad Turbahn</DisplayName>
-        <AccountId>511</AccountId>
-        <AccountType/>
-      </UserInfo>
-      <UserInfo>
-        <DisplayName>Keith Boyd</DisplayName>
-        <AccountId>993</AccountId>
-        <AccountType/>
-      </UserInfo>
-      <UserInfo>
-        <DisplayName>Christopher Harrison</DisplayName>
-        <AccountId>1176</AccountId>
-        <AccountType/>
-      </UserInfo>
-    </SharedWithUsers>
-  </documentManagement>
-</p:properties>
-</file>
-
-<file path=customXml/item7.xml><?xml version="1.0" encoding="utf-8"?>
-<Control xmlns="http://schemas.microsoft.com/VisualStudio/2011/storyboarding/control">
-  <Id Name="a53d73d2-368b-429e-b817-1324eec1382c" Revision="1" Stencil="7276b9ef-3953-4dce-a89b-ed85f20b8b93" StencilVersion="1.0"/>
-</Control>
-</file>
-
-<file path=customXml/item8.xml><?xml version="1.0" encoding="utf-8"?>
 <ct:contentTypeSchema xmlns:ct="http://schemas.microsoft.com/office/2006/metadata/contentType" xmlns:ma="http://schemas.microsoft.com/office/2006/metadata/properties/metaAttributes" ct:_="" ma:_="" ma:contentTypeName="Document" ma:contentTypeID="0x010100674EDBEC711BD14FBA6FF5C10FEFEAC7" ma:contentTypeVersion="2" ma:contentTypeDescription="Create a new document." ma:contentTypeScope="" ma:versionID="2439c5e21841780d4f192983b535a097">
   <xsd:schema xmlns:xsd="http://www.w3.org/2001/XMLSchema" xmlns:xs="http://www.w3.org/2001/XMLSchema" xmlns:p="http://schemas.microsoft.com/office/2006/metadata/properties" xmlns:ns2="83cd2334-221a-48c3-9034-bfd1542dfe28" targetNamespace="http://schemas.microsoft.com/office/2006/metadata/properties" ma:root="true" ma:fieldsID="2bca9163d8d0b233c3086236a9289b04" ns2:_="">
     <xsd:import namespace="83cd2334-221a-48c3-9034-bfd1542dfe28"/>
@@ -46813,24 +47207,301 @@
 </ct:contentTypeSchema>
 </file>
 
-<file path=customXml/item9.xml><?xml version="1.0" encoding="utf-8"?>
+<file path=customXml/item19.xml><?xml version="1.0" encoding="utf-8"?>
+<Control xmlns="http://schemas.microsoft.com/VisualStudio/2011/storyboarding/control">
+  <Id Name="369f9055-6b6c-48b9-9320-5df2d46c430a" Revision="1" Stencil="7276b9ef-3953-4dce-a89b-ed85f20b8b93" StencilVersion="1.0"/>
+</Control>
+</file>
+
+<file path=customXml/item2.xml><?xml version="1.0" encoding="utf-8"?>
 <Control xmlns="http://schemas.microsoft.com/VisualStudio/2011/storyboarding/control">
   <Id Name="a2191c86-fc50-4add-948c-129f6b5a88d8" Revision="1" Stencil="7276b9ef-3953-4dce-a89b-ed85f20b8b93" StencilVersion="1.0"/>
 </Control>
 </file>
 
+<file path=customXml/item20.xml><?xml version="1.0" encoding="utf-8"?>
+<p:properties xmlns:p="http://schemas.microsoft.com/office/2006/metadata/properties" xmlns:xsi="http://www.w3.org/2001/XMLSchema-instance" xmlns:pc="http://schemas.microsoft.com/office/infopath/2007/PartnerControls">
+  <documentManagement>
+    <SharedWithUsers xmlns="83cd2334-221a-48c3-9034-bfd1542dfe28">
+      <UserInfo>
+        <DisplayName>Gilad Turbahn</DisplayName>
+        <AccountId>511</AccountId>
+        <AccountType/>
+      </UserInfo>
+      <UserInfo>
+        <DisplayName>Keith Boyd</DisplayName>
+        <AccountId>993</AccountId>
+        <AccountType/>
+      </UserInfo>
+      <UserInfo>
+        <DisplayName>Christopher Harrison</DisplayName>
+        <AccountId>1176</AccountId>
+        <AccountType/>
+      </UserInfo>
+    </SharedWithUsers>
+  </documentManagement>
+</p:properties>
+</file>
+
+<file path=customXml/item21.xml><?xml version="1.0" encoding="utf-8"?>
+<Control xmlns="http://schemas.microsoft.com/VisualStudio/2011/storyboarding/control">
+  <Id Name="369f9055-6b6c-48b9-9320-5df2d46c430a" Revision="1" Stencil="7276b9ef-3953-4dce-a89b-ed85f20b8b93" StencilVersion="1.0"/>
+</Control>
+</file>
+
+<file path=customXml/item22.xml><?xml version="1.0" encoding="utf-8"?>
+<Control xmlns="http://schemas.microsoft.com/VisualStudio/2011/storyboarding/control">
+  <Id Name="a2191c86-fc50-4add-948c-129f6b5a88d8" Revision="1" Stencil="7276b9ef-3953-4dce-a89b-ed85f20b8b93" StencilVersion="1.0"/>
+</Control>
+</file>
+
+<file path=customXml/item23.xml><?xml version="1.0" encoding="utf-8"?>
+<Control xmlns="http://schemas.microsoft.com/VisualStudio/2011/storyboarding/control">
+  <Id Name="a53d73d2-368b-429e-b817-1324eec1382c" Revision="1" Stencil="7276b9ef-3953-4dce-a89b-ed85f20b8b93" StencilVersion="1.0"/>
+</Control>
+</file>
+
+<file path=customXml/item24.xml><?xml version="1.0" encoding="utf-8"?>
+<Control xmlns="http://schemas.microsoft.com/VisualStudio/2011/storyboarding/control">
+  <Id Name="369f9055-6b6c-48b9-9320-5df2d46c430a" Revision="1" Stencil="7276b9ef-3953-4dce-a89b-ed85f20b8b93" StencilVersion="1.0"/>
+</Control>
+</file>
+
+<file path=customXml/item25.xml><?xml version="1.0" encoding="utf-8"?>
+<Control xmlns="http://schemas.microsoft.com/VisualStudio/2011/storyboarding/control">
+  <Id Name="d69996e1-3d61-4686-9b63-f1b855c596ab" Revision="1" Stencil="7276b9ef-3953-4dce-a89b-ed85f20b8b93" StencilVersion="1.0"/>
+</Control>
+</file>
+
+<file path=customXml/item26.xml><?xml version="1.0" encoding="utf-8"?>
+<Control xmlns="http://schemas.microsoft.com/VisualStudio/2011/storyboarding/control">
+  <Id Name="fb22c541-ded0-47fa-8877-83a4c2d16227" Revision="1" Stencil="7276b9ef-3953-4dce-a89b-ed85f20b8b93" StencilVersion="1.0"/>
+</Control>
+</file>
+
+<file path=customXml/item27.xml><?xml version="1.0" encoding="utf-8"?>
+<p:properties xmlns:p="http://schemas.microsoft.com/office/2006/metadata/properties" xmlns:xsi="http://www.w3.org/2001/XMLSchema-instance" xmlns:pc="http://schemas.microsoft.com/office/infopath/2007/PartnerControls">
+  <documentManagement>
+    <SharedWithUsers xmlns="83cd2334-221a-48c3-9034-bfd1542dfe28">
+      <UserInfo>
+        <DisplayName>Gilad Turbahn</DisplayName>
+        <AccountId>511</AccountId>
+        <AccountType/>
+      </UserInfo>
+      <UserInfo>
+        <DisplayName>Keith Boyd</DisplayName>
+        <AccountId>993</AccountId>
+        <AccountType/>
+      </UserInfo>
+      <UserInfo>
+        <DisplayName>Christopher Harrison</DisplayName>
+        <AccountId>1176</AccountId>
+        <AccountType/>
+      </UserInfo>
+    </SharedWithUsers>
+  </documentManagement>
+</p:properties>
+</file>
+
+<file path=customXml/item28.xml><?xml version="1.0" encoding="utf-8"?>
+<p:properties xmlns:p="http://schemas.microsoft.com/office/2006/metadata/properties" xmlns:xsi="http://www.w3.org/2001/XMLSchema-instance" xmlns:pc="http://schemas.microsoft.com/office/infopath/2007/PartnerControls">
+  <documentManagement>
+    <SharedWithUsers xmlns="83cd2334-221a-48c3-9034-bfd1542dfe28">
+      <UserInfo>
+        <DisplayName>Gilad Turbahn</DisplayName>
+        <AccountId>511</AccountId>
+        <AccountType/>
+      </UserInfo>
+      <UserInfo>
+        <DisplayName>Keith Boyd</DisplayName>
+        <AccountId>993</AccountId>
+        <AccountType/>
+      </UserInfo>
+      <UserInfo>
+        <DisplayName>Christopher Harrison</DisplayName>
+        <AccountId>1176</AccountId>
+        <AccountType/>
+      </UserInfo>
+    </SharedWithUsers>
+  </documentManagement>
+</p:properties>
+</file>
+
+<file path=customXml/item29.xml><?xml version="1.0" encoding="utf-8"?>
+<?mso-contentType ?>
+<FormTemplates xmlns="http://schemas.microsoft.com/sharepoint/v3/contenttype/forms">
+  <Display>DocumentLibraryForm</Display>
+  <Edit>DocumentLibraryForm</Edit>
+  <New>DocumentLibraryForm</New>
+</FormTemplates>
+</file>
+
+<file path=customXml/item3.xml><?xml version="1.0" encoding="utf-8"?>
+<Control xmlns="http://schemas.microsoft.com/VisualStudio/2011/storyboarding/control">
+  <Id Name="fb22c541-ded0-47fa-8877-83a4c2d16227" Revision="1" Stencil="7276b9ef-3953-4dce-a89b-ed85f20b8b93" StencilVersion="1.0"/>
+</Control>
+</file>
+
+<file path=customXml/item30.xml><?xml version="1.0" encoding="utf-8"?>
+<Control xmlns="http://schemas.microsoft.com/VisualStudio/2011/storyboarding/control">
+  <Id Name="fb22c541-ded0-47fa-8877-83a4c2d16227" Revision="1" Stencil="7276b9ef-3953-4dce-a89b-ed85f20b8b93" StencilVersion="1.0"/>
+</Control>
+</file>
+
+<file path=customXml/item31.xml><?xml version="1.0" encoding="utf-8"?>
+<Control xmlns="http://schemas.microsoft.com/VisualStudio/2011/storyboarding/control">
+  <Id Name="369f9055-6b6c-48b9-9320-5df2d46c430a" Revision="1" Stencil="7276b9ef-3953-4dce-a89b-ed85f20b8b93" StencilVersion="1.0"/>
+</Control>
+</file>
+
+<file path=customXml/item32.xml><?xml version="1.0" encoding="utf-8"?>
+<Control xmlns="http://schemas.microsoft.com/VisualStudio/2011/storyboarding/control">
+  <Id Name="a53d73d2-368b-429e-b817-1324eec1382c" Revision="1" Stencil="7276b9ef-3953-4dce-a89b-ed85f20b8b93" StencilVersion="1.0"/>
+</Control>
+</file>
+
+<file path=customXml/item33.xml><?xml version="1.0" encoding="utf-8"?>
+<Control xmlns="http://schemas.microsoft.com/VisualStudio/2011/storyboarding/control">
+  <Id Name="369f9055-6b6c-48b9-9320-5df2d46c430a" Revision="1" Stencil="7276b9ef-3953-4dce-a89b-ed85f20b8b93" StencilVersion="1.0"/>
+</Control>
+</file>
+
+<file path=customXml/item34.xml><?xml version="1.0" encoding="utf-8"?>
+<Control xmlns="http://schemas.microsoft.com/VisualStudio/2011/storyboarding/control">
+  <Id Name="369f9055-6b6c-48b9-9320-5df2d46c430a" Revision="1" Stencil="7276b9ef-3953-4dce-a89b-ed85f20b8b93" StencilVersion="1.0"/>
+</Control>
+</file>
+
+<file path=customXml/item35.xml><?xml version="1.0" encoding="utf-8"?>
+<Control xmlns="http://schemas.microsoft.com/VisualStudio/2011/storyboarding/control">
+  <Id Name="fb22c541-ded0-47fa-8877-83a4c2d16227" Revision="1" Stencil="7276b9ef-3953-4dce-a89b-ed85f20b8b93" StencilVersion="1.0"/>
+</Control>
+</file>
+
+<file path=customXml/item36.xml><?xml version="1.0" encoding="utf-8"?>
+<Control xmlns="http://schemas.microsoft.com/VisualStudio/2011/storyboarding/control">
+  <Id Name="a2191c86-fc50-4add-948c-129f6b5a88d8" Revision="1" Stencil="7276b9ef-3953-4dce-a89b-ed85f20b8b93" StencilVersion="1.0"/>
+</Control>
+</file>
+
+<file path=customXml/item37.xml><?xml version="1.0" encoding="utf-8"?>
+<?mso-contentType ?>
+<FormTemplates xmlns="http://schemas.microsoft.com/sharepoint/v3/contenttype/forms">
+  <Display>DocumentLibraryForm</Display>
+  <Edit>DocumentLibraryForm</Edit>
+  <New>DocumentLibraryForm</New>
+</FormTemplates>
+</file>
+
+<file path=customXml/item38.xml><?xml version="1.0" encoding="utf-8"?>
+<Control xmlns="http://schemas.microsoft.com/VisualStudio/2011/storyboarding/control">
+  <Id Name="a53d73d2-368b-429e-b817-1324eec1382c" Revision="1" Stencil="7276b9ef-3953-4dce-a89b-ed85f20b8b93" StencilVersion="1.0"/>
+</Control>
+</file>
+
+<file path=customXml/item39.xml><?xml version="1.0" encoding="utf-8"?>
+<Control xmlns="http://schemas.microsoft.com/VisualStudio/2011/storyboarding/control">
+  <Id Name="a2191c86-fc50-4add-948c-129f6b5a88d8" Revision="1" Stencil="7276b9ef-3953-4dce-a89b-ed85f20b8b93" StencilVersion="1.0"/>
+</Control>
+</file>
+
+<file path=customXml/item4.xml><?xml version="1.0" encoding="utf-8"?>
+<Control xmlns="http://schemas.microsoft.com/VisualStudio/2011/storyboarding/control">
+  <Id Name="a53d73d2-368b-429e-b817-1324eec1382c" Revision="1" Stencil="7276b9ef-3953-4dce-a89b-ed85f20b8b93" StencilVersion="1.0"/>
+</Control>
+</file>
+
+<file path=customXml/item40.xml><?xml version="1.0" encoding="utf-8"?>
+<?mso-contentType ?>
+<FormTemplates xmlns="http://schemas.microsoft.com/sharepoint/v3/contenttype/forms">
+  <Display>DocumentLibraryForm</Display>
+  <Edit>DocumentLibraryForm</Edit>
+  <New>DocumentLibraryForm</New>
+</FormTemplates>
+</file>
+
+<file path=customXml/item41.xml><?xml version="1.0" encoding="utf-8"?>
+<?mso-contentType ?>
+<FormTemplates xmlns="http://schemas.microsoft.com/sharepoint/v3/contenttype/forms">
+  <Display>DocumentLibraryForm</Display>
+  <Edit>DocumentLibraryForm</Edit>
+  <New>DocumentLibraryForm</New>
+</FormTemplates>
+</file>
+
+<file path=customXml/item42.xml><?xml version="1.0" encoding="utf-8"?>
+<Control xmlns="http://schemas.microsoft.com/VisualStudio/2011/storyboarding/control">
+  <Id Name="d69996e1-3d61-4686-9b63-f1b855c596ab" Revision="1" Stencil="7276b9ef-3953-4dce-a89b-ed85f20b8b93" StencilVersion="1.0"/>
+</Control>
+</file>
+
+<file path=customXml/item43.xml><?xml version="1.0" encoding="utf-8"?>
+<?mso-contentType ?>
+<FormTemplates xmlns="http://schemas.microsoft.com/sharepoint/v3/contenttype/forms">
+  <Display>DocumentLibraryForm</Display>
+  <Edit>DocumentLibraryForm</Edit>
+  <New>DocumentLibraryForm</New>
+</FormTemplates>
+</file>
+
+<file path=customXml/item5.xml><?xml version="1.0" encoding="utf-8"?>
+<Control xmlns="http://schemas.microsoft.com/VisualStudio/2011/storyboarding/control">
+  <Id Name="d69996e1-3d61-4686-9b63-f1b855c596ab" Revision="1" Stencil="7276b9ef-3953-4dce-a89b-ed85f20b8b93" StencilVersion="1.0"/>
+</Control>
+</file>
+
+<file path=customXml/item6.xml><?xml version="1.0" encoding="utf-8"?>
+<p:properties xmlns:p="http://schemas.microsoft.com/office/2006/metadata/properties" xmlns:xsi="http://www.w3.org/2001/XMLSchema-instance" xmlns:pc="http://schemas.microsoft.com/office/infopath/2007/PartnerControls">
+  <documentManagement>
+    <SharedWithUsers xmlns="83cd2334-221a-48c3-9034-bfd1542dfe28">
+      <UserInfo>
+        <DisplayName>Gilad Turbahn</DisplayName>
+        <AccountId>511</AccountId>
+        <AccountType/>
+      </UserInfo>
+      <UserInfo>
+        <DisplayName>Keith Boyd</DisplayName>
+        <AccountId>993</AccountId>
+        <AccountType/>
+      </UserInfo>
+      <UserInfo>
+        <DisplayName>Christopher Harrison</DisplayName>
+        <AccountId>1176</AccountId>
+        <AccountType/>
+      </UserInfo>
+    </SharedWithUsers>
+  </documentManagement>
+</p:properties>
+</file>
+
+<file path=customXml/item7.xml><?xml version="1.0" encoding="utf-8"?>
+<Control xmlns="http://schemas.microsoft.com/VisualStudio/2011/storyboarding/control">
+  <Id Name="a53d73d2-368b-429e-b817-1324eec1382c" Revision="1" Stencil="7276b9ef-3953-4dce-a89b-ed85f20b8b93" StencilVersion="1.0"/>
+</Control>
+</file>
+
+<file path=customXml/item8.xml><?xml version="1.0" encoding="utf-8"?>
+<Control xmlns="http://schemas.microsoft.com/VisualStudio/2011/storyboarding/control">
+  <Id Name="d69996e1-3d61-4686-9b63-f1b855c596ab" Revision="1" Stencil="7276b9ef-3953-4dce-a89b-ed85f20b8b93" StencilVersion="1.0"/>
+</Control>
+</file>
+
+<file path=customXml/item9.xml><?xml version="1.0" encoding="utf-8"?>
+<Control xmlns="http://schemas.microsoft.com/VisualStudio/2011/storyboarding/control">
+  <Id Name="fb22c541-ded0-47fa-8877-83a4c2d16227" Revision="1" Stencil="7276b9ef-3953-4dce-a89b-ed85f20b8b93" StencilVersion="1.0"/>
+</Control>
+</file>
+
 <file path=customXml/itemProps1.xml><?xml version="1.0" encoding="utf-8"?>
-<ds:datastoreItem xmlns:ds="http://schemas.openxmlformats.org/officeDocument/2006/customXml" ds:itemID="{F990F116-B58F-4255-B05B-DA3808E0E5C6}">
+<ds:datastoreItem xmlns:ds="http://schemas.openxmlformats.org/officeDocument/2006/customXml" ds:itemID="{4E805D65-1532-4BB0-8F41-8013167C0009}">
   <ds:schemaRefs>
-    <ds:schemaRef ds:uri="http://schemas.microsoft.com/office/2006/metadata/properties"/>
-    <ds:schemaRef ds:uri="http://schemas.microsoft.com/office/infopath/2007/PartnerControls"/>
-    <ds:schemaRef ds:uri="83cd2334-221a-48c3-9034-bfd1542dfe28"/>
+    <ds:schemaRef ds:uri="http://schemas.microsoft.com/VisualStudio/2011/storyboarding/control"/>
   </ds:schemaRefs>
 </ds:datastoreItem>
 </file>
 
 <file path=customXml/itemProps10.xml><?xml version="1.0" encoding="utf-8"?>
-<ds:datastoreItem xmlns:ds="http://schemas.openxmlformats.org/officeDocument/2006/customXml" ds:itemID="{08C4EE12-DF69-4FFC-9E40-C7991F3490A6}">
+<ds:datastoreItem xmlns:ds="http://schemas.openxmlformats.org/officeDocument/2006/customXml" ds:itemID="{C0F92A87-A216-45A9-B9C0-0515663D35BF}">
   <ds:schemaRefs>
     <ds:schemaRef ds:uri="http://schemas.microsoft.com/VisualStudio/2011/storyboarding/control"/>
   </ds:schemaRefs>
@@ -46838,72 +47509,6 @@
 </file>
 
 <file path=customXml/itemProps11.xml><?xml version="1.0" encoding="utf-8"?>
-<ds:datastoreItem xmlns:ds="http://schemas.openxmlformats.org/officeDocument/2006/customXml" ds:itemID="{3DC6CABD-46E1-4C27-A0B3-616DC56F8E5C}">
-  <ds:schemaRefs>
-    <ds:schemaRef ds:uri="http://schemas.microsoft.com/VisualStudio/2011/storyboarding/control"/>
-  </ds:schemaRefs>
-</ds:datastoreItem>
-</file>
-
-<file path=customXml/itemProps12.xml><?xml version="1.0" encoding="utf-8"?>
-<ds:datastoreItem xmlns:ds="http://schemas.openxmlformats.org/officeDocument/2006/customXml" ds:itemID="{473A6A21-7521-4B81-9336-9B587BA12275}">
-  <ds:schemaRefs>
-    <ds:schemaRef ds:uri="http://schemas.microsoft.com/office/2006/metadata/properties"/>
-    <ds:schemaRef ds:uri="http://schemas.microsoft.com/office/infopath/2007/PartnerControls"/>
-    <ds:schemaRef ds:uri="83cd2334-221a-48c3-9034-bfd1542dfe28"/>
-  </ds:schemaRefs>
-</ds:datastoreItem>
-</file>
-
-<file path=customXml/itemProps13.xml><?xml version="1.0" encoding="utf-8"?>
-<ds:datastoreItem xmlns:ds="http://schemas.openxmlformats.org/officeDocument/2006/customXml" ds:itemID="{A68A9449-FA01-4226-9BF1-93D644A9D829}">
-  <ds:schemaRefs>
-    <ds:schemaRef ds:uri="http://schemas.microsoft.com/sharepoint/v3/contenttype/forms"/>
-  </ds:schemaRefs>
-</ds:datastoreItem>
-</file>
-
-<file path=customXml/itemProps14.xml><?xml version="1.0" encoding="utf-8"?>
-<ds:datastoreItem xmlns:ds="http://schemas.openxmlformats.org/officeDocument/2006/customXml" ds:itemID="{3B5E259B-2631-4B7B-A028-7E89B051B64C}">
-  <ds:schemaRefs>
-    <ds:schemaRef ds:uri="http://schemas.microsoft.com/sharepoint/v3/contenttype/forms"/>
-  </ds:schemaRefs>
-</ds:datastoreItem>
-</file>
-
-<file path=customXml/itemProps15.xml><?xml version="1.0" encoding="utf-8"?>
-<ds:datastoreItem xmlns:ds="http://schemas.openxmlformats.org/officeDocument/2006/customXml" ds:itemID="{00D921CA-9FCD-44C5-9793-9D18FCAA32EC}">
-  <ds:schemaRefs>
-    <ds:schemaRef ds:uri="http://schemas.microsoft.com/sharepoint/v3/contenttype/forms"/>
-  </ds:schemaRefs>
-</ds:datastoreItem>
-</file>
-
-<file path=customXml/itemProps16.xml><?xml version="1.0" encoding="utf-8"?>
-<ds:datastoreItem xmlns:ds="http://schemas.openxmlformats.org/officeDocument/2006/customXml" ds:itemID="{4C1B3C27-4803-4D72-A3F8-6668A3F0A24B}">
-  <ds:schemaRefs>
-    <ds:schemaRef ds:uri="http://schemas.microsoft.com/VisualStudio/2011/storyboarding/control"/>
-  </ds:schemaRefs>
-</ds:datastoreItem>
-</file>
-
-<file path=customXml/itemProps17.xml><?xml version="1.0" encoding="utf-8"?>
-<ds:datastoreItem xmlns:ds="http://schemas.openxmlformats.org/officeDocument/2006/customXml" ds:itemID="{38217AA1-CC95-49A9-B284-2ED4D347D7CA}">
-  <ds:schemaRefs>
-    <ds:schemaRef ds:uri="http://schemas.microsoft.com/VisualStudio/2011/storyboarding/control"/>
-  </ds:schemaRefs>
-</ds:datastoreItem>
-</file>
-
-<file path=customXml/itemProps18.xml><?xml version="1.0" encoding="utf-8"?>
-<ds:datastoreItem xmlns:ds="http://schemas.openxmlformats.org/officeDocument/2006/customXml" ds:itemID="{21F6B647-976A-41D0-B760-9DF9DFC6AE3C}">
-  <ds:schemaRefs>
-    <ds:schemaRef ds:uri="http://schemas.microsoft.com/VisualStudio/2011/storyboarding/control"/>
-  </ds:schemaRefs>
-</ds:datastoreItem>
-</file>
-
-<file path=customXml/itemProps19.xml><?xml version="1.0" encoding="utf-8"?>
 <ds:datastoreItem xmlns:ds="http://schemas.openxmlformats.org/officeDocument/2006/customXml" ds:itemID="{89F12441-1AE5-4DE5-9A31-72CE5A70E428}">
   <ds:schemaRefs>
     <ds:schemaRef ds:uri="http://schemas.microsoft.com/office/2006/metadata/properties"/>
@@ -46913,31 +47518,15 @@
 </ds:datastoreItem>
 </file>
 
-<file path=customXml/itemProps2.xml><?xml version="1.0" encoding="utf-8"?>
-<ds:datastoreItem xmlns:ds="http://schemas.openxmlformats.org/officeDocument/2006/customXml" ds:itemID="{3C954CC5-1CAC-4EC3-9791-8630483065B9}">
-  <ds:schemaRefs>
-    <ds:schemaRef ds:uri="http://schemas.microsoft.com/VisualStudio/2011/storyboarding/control"/>
-  </ds:schemaRefs>
-</ds:datastoreItem>
-</file>
-
-<file path=customXml/itemProps20.xml><?xml version="1.0" encoding="utf-8"?>
-<ds:datastoreItem xmlns:ds="http://schemas.openxmlformats.org/officeDocument/2006/customXml" ds:itemID="{366CA990-F93D-4100-9654-65D9E30F4E1C}">
-  <ds:schemaRefs>
-    <ds:schemaRef ds:uri="http://schemas.microsoft.com/VisualStudio/2011/storyboarding/control"/>
-  </ds:schemaRefs>
-</ds:datastoreItem>
-</file>
-
-<file path=customXml/itemProps21.xml><?xml version="1.0" encoding="utf-8"?>
-<ds:datastoreItem xmlns:ds="http://schemas.openxmlformats.org/officeDocument/2006/customXml" ds:itemID="{758FDAC0-319D-4A54-8D8E-1D42CB1F8004}">
+<file path=customXml/itemProps12.xml><?xml version="1.0" encoding="utf-8"?>
+<ds:datastoreItem xmlns:ds="http://schemas.openxmlformats.org/officeDocument/2006/customXml" ds:itemID="{3B5E259B-2631-4B7B-A028-7E89B051B64C}">
   <ds:schemaRefs>
     <ds:schemaRef ds:uri="http://schemas.microsoft.com/sharepoint/v3/contenttype/forms"/>
   </ds:schemaRefs>
 </ds:datastoreItem>
 </file>
 
-<file path=customXml/itemProps22.xml><?xml version="1.0" encoding="utf-8"?>
+<file path=customXml/itemProps13.xml><?xml version="1.0" encoding="utf-8"?>
 <ds:datastoreItem xmlns:ds="http://schemas.openxmlformats.org/officeDocument/2006/customXml" ds:itemID="{C63AC2F0-1DEB-4E91-A88A-7A014A172F4F}">
   <ds:schemaRefs>
     <ds:schemaRef ds:uri="http://schemas.microsoft.com/VisualStudio/2011/storyboarding/control"/>
@@ -46945,41 +47534,7 @@
 </ds:datastoreItem>
 </file>
 
-<file path=customXml/itemProps23.xml><?xml version="1.0" encoding="utf-8"?>
-<ds:datastoreItem xmlns:ds="http://schemas.openxmlformats.org/officeDocument/2006/customXml" ds:itemID="{4E8278DB-3CDD-48A7-992E-A7596AD335B9}">
-  <ds:schemaRefs>
-    <ds:schemaRef ds:uri="http://schemas.microsoft.com/VisualStudio/2011/storyboarding/control"/>
-  </ds:schemaRefs>
-</ds:datastoreItem>
-</file>
-
-<file path=customXml/itemProps24.xml><?xml version="1.0" encoding="utf-8"?>
-<ds:datastoreItem xmlns:ds="http://schemas.openxmlformats.org/officeDocument/2006/customXml" ds:itemID="{DD228CD4-1C93-4EFE-9A88-31B415F02594}">
-  <ds:schemaRefs>
-    <ds:schemaRef ds:uri="http://schemas.microsoft.com/office/2006/metadata/properties"/>
-    <ds:schemaRef ds:uri="http://schemas.microsoft.com/office/infopath/2007/PartnerControls"/>
-    <ds:schemaRef ds:uri="83cd2334-221a-48c3-9034-bfd1542dfe28"/>
-  </ds:schemaRefs>
-</ds:datastoreItem>
-</file>
-
-<file path=customXml/itemProps25.xml><?xml version="1.0" encoding="utf-8"?>
-<ds:datastoreItem xmlns:ds="http://schemas.openxmlformats.org/officeDocument/2006/customXml" ds:itemID="{8BD595CA-AC5E-43B9-B966-E468A16E8322}">
-  <ds:schemaRefs>
-    <ds:schemaRef ds:uri="http://schemas.microsoft.com/VisualStudio/2011/storyboarding/control"/>
-  </ds:schemaRefs>
-</ds:datastoreItem>
-</file>
-
-<file path=customXml/itemProps26.xml><?xml version="1.0" encoding="utf-8"?>
-<ds:datastoreItem xmlns:ds="http://schemas.openxmlformats.org/officeDocument/2006/customXml" ds:itemID="{8257D6BC-B71E-4D95-81E4-A1D4A8174168}">
-  <ds:schemaRefs>
-    <ds:schemaRef ds:uri="http://schemas.microsoft.com/VisualStudio/2011/storyboarding/control"/>
-  </ds:schemaRefs>
-</ds:datastoreItem>
-</file>
-
-<file path=customXml/itemProps27.xml><?xml version="1.0" encoding="utf-8"?>
+<file path=customXml/itemProps14.xml><?xml version="1.0" encoding="utf-8"?>
 <ds:datastoreItem xmlns:ds="http://schemas.openxmlformats.org/officeDocument/2006/customXml" ds:itemID="{4B16F4FE-7C26-4443-B426-81998D23ED87}">
   <ds:schemaRefs>
     <ds:schemaRef ds:uri="http://schemas.microsoft.com/VisualStudio/2011/storyboarding/control"/>
@@ -46987,31 +47542,7 @@
 </ds:datastoreItem>
 </file>
 
-<file path=customXml/itemProps28.xml><?xml version="1.0" encoding="utf-8"?>
-<ds:datastoreItem xmlns:ds="http://schemas.openxmlformats.org/officeDocument/2006/customXml" ds:itemID="{42D603BF-B513-4201-A599-21BA0F4FFC40}">
-  <ds:schemaRefs>
-    <ds:schemaRef ds:uri="http://schemas.microsoft.com/VisualStudio/2011/storyboarding/control"/>
-  </ds:schemaRefs>
-</ds:datastoreItem>
-</file>
-
-<file path=customXml/itemProps29.xml><?xml version="1.0" encoding="utf-8"?>
-<ds:datastoreItem xmlns:ds="http://schemas.openxmlformats.org/officeDocument/2006/customXml" ds:itemID="{6FB9D450-4C47-4A44-8C0D-C78D8A54C46F}">
-  <ds:schemaRefs>
-    <ds:schemaRef ds:uri="http://schemas.microsoft.com/VisualStudio/2011/storyboarding/control"/>
-  </ds:schemaRefs>
-</ds:datastoreItem>
-</file>
-
-<file path=customXml/itemProps3.xml><?xml version="1.0" encoding="utf-8"?>
-<ds:datastoreItem xmlns:ds="http://schemas.openxmlformats.org/officeDocument/2006/customXml" ds:itemID="{FE651ABA-5DC1-4ABD-A06E-055AE54B337B}">
-  <ds:schemaRefs>
-    <ds:schemaRef ds:uri="http://schemas.microsoft.com/VisualStudio/2011/storyboarding/control"/>
-  </ds:schemaRefs>
-</ds:datastoreItem>
-</file>
-
-<file path=customXml/itemProps30.xml><?xml version="1.0" encoding="utf-8"?>
+<file path=customXml/itemProps15.xml><?xml version="1.0" encoding="utf-8"?>
 <ds:datastoreItem xmlns:ds="http://schemas.openxmlformats.org/officeDocument/2006/customXml" ds:itemID="{D2785389-C2C5-4270-958A-D22E6E646BAE}">
   <ds:schemaRefs>
     <ds:schemaRef ds:uri="http://schemas.microsoft.com/office/2006/metadata/properties"/>
@@ -47021,39 +47552,7 @@
 </ds:datastoreItem>
 </file>
 
-<file path=customXml/itemProps31.xml><?xml version="1.0" encoding="utf-8"?>
-<ds:datastoreItem xmlns:ds="http://schemas.openxmlformats.org/officeDocument/2006/customXml" ds:itemID="{82DB428A-B8F8-483F-8276-095629A8ECDB}">
-  <ds:schemaRefs>
-    <ds:schemaRef ds:uri="http://schemas.microsoft.com/VisualStudio/2011/storyboarding/control"/>
-  </ds:schemaRefs>
-</ds:datastoreItem>
-</file>
-
-<file path=customXml/itemProps32.xml><?xml version="1.0" encoding="utf-8"?>
-<ds:datastoreItem xmlns:ds="http://schemas.openxmlformats.org/officeDocument/2006/customXml" ds:itemID="{ED350DFE-2319-4AB0-BC96-1D36D125365A}">
-  <ds:schemaRefs>
-    <ds:schemaRef ds:uri="http://schemas.microsoft.com/VisualStudio/2011/storyboarding/control"/>
-  </ds:schemaRefs>
-</ds:datastoreItem>
-</file>
-
-<file path=customXml/itemProps33.xml><?xml version="1.0" encoding="utf-8"?>
-<ds:datastoreItem xmlns:ds="http://schemas.openxmlformats.org/officeDocument/2006/customXml" ds:itemID="{8893E80D-6D0C-4E0F-AA22-E5615BB87E5B}">
-  <ds:schemaRefs>
-    <ds:schemaRef ds:uri="http://schemas.microsoft.com/VisualStudio/2011/storyboarding/control"/>
-  </ds:schemaRefs>
-</ds:datastoreItem>
-</file>
-
-<file path=customXml/itemProps34.xml><?xml version="1.0" encoding="utf-8"?>
-<ds:datastoreItem xmlns:ds="http://schemas.openxmlformats.org/officeDocument/2006/customXml" ds:itemID="{0282FB20-2D4C-459D-8468-77D1D3C6925D}">
-  <ds:schemaRefs>
-    <ds:schemaRef ds:uri="http://schemas.microsoft.com/VisualStudio/2011/storyboarding/control"/>
-  </ds:schemaRefs>
-</ds:datastoreItem>
-</file>
-
-<file path=customXml/itemProps35.xml><?xml version="1.0" encoding="utf-8"?>
+<file path=customXml/itemProps16.xml><?xml version="1.0" encoding="utf-8"?>
 <ds:datastoreItem xmlns:ds="http://schemas.openxmlformats.org/officeDocument/2006/customXml" ds:itemID="{0B54C583-7BAB-4080-8093-C5F84F5A225A}">
   <ds:schemaRefs>
     <ds:schemaRef ds:uri="http://schemas.microsoft.com/VisualStudio/2011/storyboarding/control"/>
@@ -47061,71 +47560,7 @@
 </ds:datastoreItem>
 </file>
 
-<file path=customXml/itemProps36.xml><?xml version="1.0" encoding="utf-8"?>
-<ds:datastoreItem xmlns:ds="http://schemas.openxmlformats.org/officeDocument/2006/customXml" ds:itemID="{F68D8396-E21C-4AFF-8FDD-70D00673D0EE}">
-  <ds:schemaRefs>
-    <ds:schemaRef ds:uri="http://schemas.microsoft.com/VisualStudio/2011/storyboarding/control"/>
-  </ds:schemaRefs>
-</ds:datastoreItem>
-</file>
-
-<file path=customXml/itemProps37.xml><?xml version="1.0" encoding="utf-8"?>
-<ds:datastoreItem xmlns:ds="http://schemas.openxmlformats.org/officeDocument/2006/customXml" ds:itemID="{67213E6F-7B96-4222-888B-63710B06D885}">
-  <ds:schemaRefs>
-    <ds:schemaRef ds:uri="http://schemas.microsoft.com/VisualStudio/2011/storyboarding/control"/>
-  </ds:schemaRefs>
-</ds:datastoreItem>
-</file>
-
-<file path=customXml/itemProps38.xml><?xml version="1.0" encoding="utf-8"?>
-<ds:datastoreItem xmlns:ds="http://schemas.openxmlformats.org/officeDocument/2006/customXml" ds:itemID="{7959CC6A-F423-4783-B968-3BCC86A7394E}">
-  <ds:schemaRefs>
-    <ds:schemaRef ds:uri="http://schemas.microsoft.com/VisualStudio/2011/storyboarding/control"/>
-  </ds:schemaRefs>
-</ds:datastoreItem>
-</file>
-
-<file path=customXml/itemProps39.xml><?xml version="1.0" encoding="utf-8"?>
-<ds:datastoreItem xmlns:ds="http://schemas.openxmlformats.org/officeDocument/2006/customXml" ds:itemID="{9360AFB9-8F99-4E1B-878D-F2EBABEB164C}">
-  <ds:schemaRefs>
-    <ds:schemaRef ds:uri="http://schemas.microsoft.com/sharepoint/v3/contenttype/forms"/>
-  </ds:schemaRefs>
-</ds:datastoreItem>
-</file>
-
-<file path=customXml/itemProps4.xml><?xml version="1.0" encoding="utf-8"?>
-<ds:datastoreItem xmlns:ds="http://schemas.openxmlformats.org/officeDocument/2006/customXml" ds:itemID="{D6FEE829-2115-45B4-8110-670FD454542B}">
-  <ds:schemaRefs>
-    <ds:schemaRef ds:uri="http://schemas.microsoft.com/VisualStudio/2011/storyboarding/control"/>
-  </ds:schemaRefs>
-</ds:datastoreItem>
-</file>
-
-<file path=customXml/itemProps40.xml><?xml version="1.0" encoding="utf-8"?>
-<ds:datastoreItem xmlns:ds="http://schemas.openxmlformats.org/officeDocument/2006/customXml" ds:itemID="{B5105A87-47B6-44F6-97FD-4619C0556604}">
-  <ds:schemaRefs>
-    <ds:schemaRef ds:uri="http://schemas.microsoft.com/VisualStudio/2011/storyboarding/control"/>
-  </ds:schemaRefs>
-</ds:datastoreItem>
-</file>
-
-<file path=customXml/itemProps41.xml><?xml version="1.0" encoding="utf-8"?>
-<ds:datastoreItem xmlns:ds="http://schemas.openxmlformats.org/officeDocument/2006/customXml" ds:itemID="{376216F9-AF6B-4844-AE8C-B9F953F916AB}">
-  <ds:schemaRefs>
-    <ds:schemaRef ds:uri="http://schemas.microsoft.com/VisualStudio/2011/storyboarding/control"/>
-  </ds:schemaRefs>
-</ds:datastoreItem>
-</file>
-
-<file path=customXml/itemProps42.xml><?xml version="1.0" encoding="utf-8"?>
-<ds:datastoreItem xmlns:ds="http://schemas.openxmlformats.org/officeDocument/2006/customXml" ds:itemID="{1EF25EC2-965B-4491-9691-6B806C9E3B8B}">
-  <ds:schemaRefs>
-    <ds:schemaRef ds:uri="http://schemas.microsoft.com/sharepoint/v3/contenttype/forms"/>
-  </ds:schemaRefs>
-</ds:datastoreItem>
-</file>
-
-<file path=customXml/itemProps43.xml><?xml version="1.0" encoding="utf-8"?>
+<file path=customXml/itemProps17.xml><?xml version="1.0" encoding="utf-8"?>
 <ds:datastoreItem xmlns:ds="http://schemas.openxmlformats.org/officeDocument/2006/customXml" ds:itemID="{432851C6-BC05-4673-B853-6D08AB80CDC4}">
   <ds:schemaRefs>
     <ds:schemaRef ds:uri="http://schemas.microsoft.com/VisualStudio/2011/storyboarding/control"/>
@@ -47133,33 +47568,7 @@
 </ds:datastoreItem>
 </file>
 
-<file path=customXml/itemProps5.xml><?xml version="1.0" encoding="utf-8"?>
-<ds:datastoreItem xmlns:ds="http://schemas.openxmlformats.org/officeDocument/2006/customXml" ds:itemID="{C0F92A87-A216-45A9-B9C0-0515663D35BF}">
-  <ds:schemaRefs>
-    <ds:schemaRef ds:uri="http://schemas.microsoft.com/VisualStudio/2011/storyboarding/control"/>
-  </ds:schemaRefs>
-</ds:datastoreItem>
-</file>
-
-<file path=customXml/itemProps6.xml><?xml version="1.0" encoding="utf-8"?>
-<ds:datastoreItem xmlns:ds="http://schemas.openxmlformats.org/officeDocument/2006/customXml" ds:itemID="{E692D73E-1478-4790-BEEC-C5C534998F40}">
-  <ds:schemaRefs>
-    <ds:schemaRef ds:uri="http://schemas.microsoft.com/office/2006/metadata/properties"/>
-    <ds:schemaRef ds:uri="http://schemas.microsoft.com/office/infopath/2007/PartnerControls"/>
-    <ds:schemaRef ds:uri="83cd2334-221a-48c3-9034-bfd1542dfe28"/>
-  </ds:schemaRefs>
-</ds:datastoreItem>
-</file>
-
-<file path=customXml/itemProps7.xml><?xml version="1.0" encoding="utf-8"?>
-<ds:datastoreItem xmlns:ds="http://schemas.openxmlformats.org/officeDocument/2006/customXml" ds:itemID="{4E805D65-1532-4BB0-8F41-8013167C0009}">
-  <ds:schemaRefs>
-    <ds:schemaRef ds:uri="http://schemas.microsoft.com/VisualStudio/2011/storyboarding/control"/>
-  </ds:schemaRefs>
-</ds:datastoreItem>
-</file>
-
-<file path=customXml/itemProps8.xml><?xml version="1.0" encoding="utf-8"?>
+<file path=customXml/itemProps18.xml><?xml version="1.0" encoding="utf-8"?>
 <ds:datastoreItem xmlns:ds="http://schemas.openxmlformats.org/officeDocument/2006/customXml" ds:itemID="{11F98F69-7518-4AE2-AE7B-E037DC9DDC97}">
   <ds:schemaRefs>
     <ds:schemaRef ds:uri="http://schemas.microsoft.com/office/2006/metadata/contentType"/>
@@ -47177,10 +47586,274 @@
 </ds:datastoreItem>
 </file>
 
-<file path=customXml/itemProps9.xml><?xml version="1.0" encoding="utf-8"?>
+<file path=customXml/itemProps19.xml><?xml version="1.0" encoding="utf-8"?>
+<ds:datastoreItem xmlns:ds="http://schemas.openxmlformats.org/officeDocument/2006/customXml" ds:itemID="{FE651ABA-5DC1-4ABD-A06E-055AE54B337B}">
+  <ds:schemaRefs>
+    <ds:schemaRef ds:uri="http://schemas.microsoft.com/VisualStudio/2011/storyboarding/control"/>
+  </ds:schemaRefs>
+</ds:datastoreItem>
+</file>
+
+<file path=customXml/itemProps2.xml><?xml version="1.0" encoding="utf-8"?>
+<ds:datastoreItem xmlns:ds="http://schemas.openxmlformats.org/officeDocument/2006/customXml" ds:itemID="{3C954CC5-1CAC-4EC3-9791-8630483065B9}">
+  <ds:schemaRefs>
+    <ds:schemaRef ds:uri="http://schemas.microsoft.com/VisualStudio/2011/storyboarding/control"/>
+  </ds:schemaRefs>
+</ds:datastoreItem>
+</file>
+
+<file path=customXml/itemProps20.xml><?xml version="1.0" encoding="utf-8"?>
+<ds:datastoreItem xmlns:ds="http://schemas.openxmlformats.org/officeDocument/2006/customXml" ds:itemID="{473A6A21-7521-4B81-9336-9B587BA12275}">
+  <ds:schemaRefs>
+    <ds:schemaRef ds:uri="http://schemas.microsoft.com/office/2006/metadata/properties"/>
+    <ds:schemaRef ds:uri="http://schemas.microsoft.com/office/infopath/2007/PartnerControls"/>
+    <ds:schemaRef ds:uri="83cd2334-221a-48c3-9034-bfd1542dfe28"/>
+  </ds:schemaRefs>
+</ds:datastoreItem>
+</file>
+
+<file path=customXml/itemProps21.xml><?xml version="1.0" encoding="utf-8"?>
+<ds:datastoreItem xmlns:ds="http://schemas.openxmlformats.org/officeDocument/2006/customXml" ds:itemID="{38217AA1-CC95-49A9-B284-2ED4D347D7CA}">
+  <ds:schemaRefs>
+    <ds:schemaRef ds:uri="http://schemas.microsoft.com/VisualStudio/2011/storyboarding/control"/>
+  </ds:schemaRefs>
+</ds:datastoreItem>
+</file>
+
+<file path=customXml/itemProps22.xml><?xml version="1.0" encoding="utf-8"?>
+<ds:datastoreItem xmlns:ds="http://schemas.openxmlformats.org/officeDocument/2006/customXml" ds:itemID="{8BD595CA-AC5E-43B9-B966-E468A16E8322}">
+  <ds:schemaRefs>
+    <ds:schemaRef ds:uri="http://schemas.microsoft.com/VisualStudio/2011/storyboarding/control"/>
+  </ds:schemaRefs>
+</ds:datastoreItem>
+</file>
+
+<file path=customXml/itemProps23.xml><?xml version="1.0" encoding="utf-8"?>
+<ds:datastoreItem xmlns:ds="http://schemas.openxmlformats.org/officeDocument/2006/customXml" ds:itemID="{8893E80D-6D0C-4E0F-AA22-E5615BB87E5B}">
+  <ds:schemaRefs>
+    <ds:schemaRef ds:uri="http://schemas.microsoft.com/VisualStudio/2011/storyboarding/control"/>
+  </ds:schemaRefs>
+</ds:datastoreItem>
+</file>
+
+<file path=customXml/itemProps24.xml><?xml version="1.0" encoding="utf-8"?>
+<ds:datastoreItem xmlns:ds="http://schemas.openxmlformats.org/officeDocument/2006/customXml" ds:itemID="{7959CC6A-F423-4783-B968-3BCC86A7394E}">
+  <ds:schemaRefs>
+    <ds:schemaRef ds:uri="http://schemas.microsoft.com/VisualStudio/2011/storyboarding/control"/>
+  </ds:schemaRefs>
+</ds:datastoreItem>
+</file>
+
+<file path=customXml/itemProps25.xml><?xml version="1.0" encoding="utf-8"?>
+<ds:datastoreItem xmlns:ds="http://schemas.openxmlformats.org/officeDocument/2006/customXml" ds:itemID="{366CA990-F93D-4100-9654-65D9E30F4E1C}">
+  <ds:schemaRefs>
+    <ds:schemaRef ds:uri="http://schemas.microsoft.com/VisualStudio/2011/storyboarding/control"/>
+  </ds:schemaRefs>
+</ds:datastoreItem>
+</file>
+
+<file path=customXml/itemProps26.xml><?xml version="1.0" encoding="utf-8"?>
+<ds:datastoreItem xmlns:ds="http://schemas.openxmlformats.org/officeDocument/2006/customXml" ds:itemID="{376216F9-AF6B-4844-AE8C-B9F953F916AB}">
+  <ds:schemaRefs>
+    <ds:schemaRef ds:uri="http://schemas.microsoft.com/VisualStudio/2011/storyboarding/control"/>
+  </ds:schemaRefs>
+</ds:datastoreItem>
+</file>
+
+<file path=customXml/itemProps27.xml><?xml version="1.0" encoding="utf-8"?>
+<ds:datastoreItem xmlns:ds="http://schemas.openxmlformats.org/officeDocument/2006/customXml" ds:itemID="{F990F116-B58F-4255-B05B-DA3808E0E5C6}">
+  <ds:schemaRefs>
+    <ds:schemaRef ds:uri="http://schemas.microsoft.com/office/2006/metadata/properties"/>
+    <ds:schemaRef ds:uri="http://schemas.microsoft.com/office/infopath/2007/PartnerControls"/>
+    <ds:schemaRef ds:uri="83cd2334-221a-48c3-9034-bfd1542dfe28"/>
+  </ds:schemaRefs>
+</ds:datastoreItem>
+</file>
+
+<file path=customXml/itemProps28.xml><?xml version="1.0" encoding="utf-8"?>
+<ds:datastoreItem xmlns:ds="http://schemas.openxmlformats.org/officeDocument/2006/customXml" ds:itemID="{E692D73E-1478-4790-BEEC-C5C534998F40}">
+  <ds:schemaRefs>
+    <ds:schemaRef ds:uri="http://schemas.microsoft.com/office/2006/metadata/properties"/>
+    <ds:schemaRef ds:uri="http://schemas.microsoft.com/office/infopath/2007/PartnerControls"/>
+    <ds:schemaRef ds:uri="83cd2334-221a-48c3-9034-bfd1542dfe28"/>
+  </ds:schemaRefs>
+</ds:datastoreItem>
+</file>
+
+<file path=customXml/itemProps29.xml><?xml version="1.0" encoding="utf-8"?>
+<ds:datastoreItem xmlns:ds="http://schemas.openxmlformats.org/officeDocument/2006/customXml" ds:itemID="{00D921CA-9FCD-44C5-9793-9D18FCAA32EC}">
+  <ds:schemaRefs>
+    <ds:schemaRef ds:uri="http://schemas.microsoft.com/sharepoint/v3/contenttype/forms"/>
+  </ds:schemaRefs>
+</ds:datastoreItem>
+</file>
+
+<file path=customXml/itemProps3.xml><?xml version="1.0" encoding="utf-8"?>
+<ds:datastoreItem xmlns:ds="http://schemas.openxmlformats.org/officeDocument/2006/customXml" ds:itemID="{4C1B3C27-4803-4D72-A3F8-6668A3F0A24B}">
+  <ds:schemaRefs>
+    <ds:schemaRef ds:uri="http://schemas.microsoft.com/VisualStudio/2011/storyboarding/control"/>
+  </ds:schemaRefs>
+</ds:datastoreItem>
+</file>
+
+<file path=customXml/itemProps30.xml><?xml version="1.0" encoding="utf-8"?>
+<ds:datastoreItem xmlns:ds="http://schemas.openxmlformats.org/officeDocument/2006/customXml" ds:itemID="{4E8278DB-3CDD-48A7-992E-A7596AD335B9}">
+  <ds:schemaRefs>
+    <ds:schemaRef ds:uri="http://schemas.microsoft.com/VisualStudio/2011/storyboarding/control"/>
+  </ds:schemaRefs>
+</ds:datastoreItem>
+</file>
+
+<file path=customXml/itemProps31.xml><?xml version="1.0" encoding="utf-8"?>
+<ds:datastoreItem xmlns:ds="http://schemas.openxmlformats.org/officeDocument/2006/customXml" ds:itemID="{42D603BF-B513-4201-A599-21BA0F4FFC40}">
+  <ds:schemaRefs>
+    <ds:schemaRef ds:uri="http://schemas.microsoft.com/VisualStudio/2011/storyboarding/control"/>
+  </ds:schemaRefs>
+</ds:datastoreItem>
+</file>
+
+<file path=customXml/itemProps32.xml><?xml version="1.0" encoding="utf-8"?>
+<ds:datastoreItem xmlns:ds="http://schemas.openxmlformats.org/officeDocument/2006/customXml" ds:itemID="{F68D8396-E21C-4AFF-8FDD-70D00673D0EE}">
+  <ds:schemaRefs>
+    <ds:schemaRef ds:uri="http://schemas.microsoft.com/VisualStudio/2011/storyboarding/control"/>
+  </ds:schemaRefs>
+</ds:datastoreItem>
+</file>
+
+<file path=customXml/itemProps33.xml><?xml version="1.0" encoding="utf-8"?>
+<ds:datastoreItem xmlns:ds="http://schemas.openxmlformats.org/officeDocument/2006/customXml" ds:itemID="{08C4EE12-DF69-4FFC-9E40-C7991F3490A6}">
+  <ds:schemaRefs>
+    <ds:schemaRef ds:uri="http://schemas.microsoft.com/VisualStudio/2011/storyboarding/control"/>
+  </ds:schemaRefs>
+</ds:datastoreItem>
+</file>
+
+<file path=customXml/itemProps34.xml><?xml version="1.0" encoding="utf-8"?>
+<ds:datastoreItem xmlns:ds="http://schemas.openxmlformats.org/officeDocument/2006/customXml" ds:itemID="{82DB428A-B8F8-483F-8276-095629A8ECDB}">
+  <ds:schemaRefs>
+    <ds:schemaRef ds:uri="http://schemas.microsoft.com/VisualStudio/2011/storyboarding/control"/>
+  </ds:schemaRefs>
+</ds:datastoreItem>
+</file>
+
+<file path=customXml/itemProps35.xml><?xml version="1.0" encoding="utf-8"?>
+<ds:datastoreItem xmlns:ds="http://schemas.openxmlformats.org/officeDocument/2006/customXml" ds:itemID="{D6FEE829-2115-45B4-8110-670FD454542B}">
+  <ds:schemaRefs>
+    <ds:schemaRef ds:uri="http://schemas.microsoft.com/VisualStudio/2011/storyboarding/control"/>
+  </ds:schemaRefs>
+</ds:datastoreItem>
+</file>
+
+<file path=customXml/itemProps36.xml><?xml version="1.0" encoding="utf-8"?>
 <ds:datastoreItem xmlns:ds="http://schemas.openxmlformats.org/officeDocument/2006/customXml" ds:itemID="{D4B5F268-5930-44CD-BDF1-D0A04D4BBC1C}">
   <ds:schemaRefs>
     <ds:schemaRef ds:uri="http://schemas.microsoft.com/VisualStudio/2011/storyboarding/control"/>
   </ds:schemaRefs>
 </ds:datastoreItem>
+</file>
+
+<file path=customXml/itemProps37.xml><?xml version="1.0" encoding="utf-8"?>
+<ds:datastoreItem xmlns:ds="http://schemas.openxmlformats.org/officeDocument/2006/customXml" ds:itemID="{A68A9449-FA01-4226-9BF1-93D644A9D829}">
+  <ds:schemaRefs>
+    <ds:schemaRef ds:uri="http://schemas.microsoft.com/sharepoint/v3/contenttype/forms"/>
+  </ds:schemaRefs>
+</ds:datastoreItem>
+</file>
+
+<file path=customXml/itemProps38.xml><?xml version="1.0" encoding="utf-8"?>
+<ds:datastoreItem xmlns:ds="http://schemas.openxmlformats.org/officeDocument/2006/customXml" ds:itemID="{21F6B647-976A-41D0-B760-9DF9DFC6AE3C}">
+  <ds:schemaRefs>
+    <ds:schemaRef ds:uri="http://schemas.microsoft.com/VisualStudio/2011/storyboarding/control"/>
+  </ds:schemaRefs>
+</ds:datastoreItem>
+</file>
+
+<file path=customXml/itemProps39.xml><?xml version="1.0" encoding="utf-8"?>
+<ds:datastoreItem xmlns:ds="http://schemas.openxmlformats.org/officeDocument/2006/customXml" ds:itemID="{8257D6BC-B71E-4D95-81E4-A1D4A8174168}">
+  <ds:schemaRefs>
+    <ds:schemaRef ds:uri="http://schemas.microsoft.com/VisualStudio/2011/storyboarding/control"/>
+  </ds:schemaRefs>
+</ds:datastoreItem>
+</file>
+
+<file path=customXml/itemProps4.xml><?xml version="1.0" encoding="utf-8"?>
+<ds:datastoreItem xmlns:ds="http://schemas.openxmlformats.org/officeDocument/2006/customXml" ds:itemID="{6FB9D450-4C47-4A44-8C0D-C78D8A54C46F}">
+  <ds:schemaRefs>
+    <ds:schemaRef ds:uri="http://schemas.microsoft.com/VisualStudio/2011/storyboarding/control"/>
+  </ds:schemaRefs>
+</ds:datastoreItem>
+</file>
+
+<file path=customXml/itemProps40.xml><?xml version="1.0" encoding="utf-8"?>
+<ds:datastoreItem xmlns:ds="http://schemas.openxmlformats.org/officeDocument/2006/customXml" ds:itemID="{9360AFB9-8F99-4E1B-878D-F2EBABEB164C}">
+  <ds:schemaRefs>
+    <ds:schemaRef ds:uri="http://schemas.microsoft.com/sharepoint/v3/contenttype/forms"/>
+  </ds:schemaRefs>
+</ds:datastoreItem>
+</file>
+
+<file path=customXml/itemProps41.xml><?xml version="1.0" encoding="utf-8"?>
+<ds:datastoreItem xmlns:ds="http://schemas.openxmlformats.org/officeDocument/2006/customXml" ds:itemID="{758FDAC0-319D-4A54-8D8E-1D42CB1F8004}">
+  <ds:schemaRefs>
+    <ds:schemaRef ds:uri="http://schemas.microsoft.com/sharepoint/v3/contenttype/forms"/>
+  </ds:schemaRefs>
+</ds:datastoreItem>
+</file>
+
+<file path=customXml/itemProps42.xml><?xml version="1.0" encoding="utf-8"?>
+<ds:datastoreItem xmlns:ds="http://schemas.openxmlformats.org/officeDocument/2006/customXml" ds:itemID="{0282FB20-2D4C-459D-8468-77D1D3C6925D}">
+  <ds:schemaRefs>
+    <ds:schemaRef ds:uri="http://schemas.microsoft.com/VisualStudio/2011/storyboarding/control"/>
+  </ds:schemaRefs>
+</ds:datastoreItem>
+</file>
+
+<file path=customXml/itemProps43.xml><?xml version="1.0" encoding="utf-8"?>
+<ds:datastoreItem xmlns:ds="http://schemas.openxmlformats.org/officeDocument/2006/customXml" ds:itemID="{1EF25EC2-965B-4491-9691-6B806C9E3B8B}">
+  <ds:schemaRefs>
+    <ds:schemaRef ds:uri="http://schemas.microsoft.com/sharepoint/v3/contenttype/forms"/>
+  </ds:schemaRefs>
+</ds:datastoreItem>
+</file>
+
+<file path=customXml/itemProps5.xml><?xml version="1.0" encoding="utf-8"?>
+<ds:datastoreItem xmlns:ds="http://schemas.openxmlformats.org/officeDocument/2006/customXml" ds:itemID="{3DC6CABD-46E1-4C27-A0B3-616DC56F8E5C}">
+  <ds:schemaRefs>
+    <ds:schemaRef ds:uri="http://schemas.microsoft.com/VisualStudio/2011/storyboarding/control"/>
+  </ds:schemaRefs>
+</ds:datastoreItem>
+</file>
+
+<file path=customXml/itemProps6.xml><?xml version="1.0" encoding="utf-8"?>
+<ds:datastoreItem xmlns:ds="http://schemas.openxmlformats.org/officeDocument/2006/customXml" ds:itemID="{DD228CD4-1C93-4EFE-9A88-31B415F02594}">
+  <ds:schemaRefs>
+    <ds:schemaRef ds:uri="http://schemas.microsoft.com/office/2006/metadata/properties"/>
+    <ds:schemaRef ds:uri="http://schemas.microsoft.com/office/infopath/2007/PartnerControls"/>
+    <ds:schemaRef ds:uri="83cd2334-221a-48c3-9034-bfd1542dfe28"/>
+  </ds:schemaRefs>
+</ds:datastoreItem>
+</file>
+
+<file path=customXml/itemProps7.xml><?xml version="1.0" encoding="utf-8"?>
+<ds:datastoreItem xmlns:ds="http://schemas.openxmlformats.org/officeDocument/2006/customXml" ds:itemID="{ED350DFE-2319-4AB0-BC96-1D36D125365A}">
+  <ds:schemaRefs>
+    <ds:schemaRef ds:uri="http://schemas.microsoft.com/VisualStudio/2011/storyboarding/control"/>
+  </ds:schemaRefs>
+</ds:datastoreItem>
+</file>
+
+<file path=customXml/itemProps8.xml><?xml version="1.0" encoding="utf-8"?>
+<ds:datastoreItem xmlns:ds="http://schemas.openxmlformats.org/officeDocument/2006/customXml" ds:itemID="{67213E6F-7B96-4222-888B-63710B06D885}">
+  <ds:schemaRefs>
+    <ds:schemaRef ds:uri="http://schemas.microsoft.com/VisualStudio/2011/storyboarding/control"/>
+  </ds:schemaRefs>
+</ds:datastoreItem>
+</file>
+
+<file path=customXml/itemProps9.xml><?xml version="1.0" encoding="utf-8"?>
+<ds:datastoreItem xmlns:ds="http://schemas.openxmlformats.org/officeDocument/2006/customXml" ds:itemID="{B5105A87-47B6-44F6-97FD-4619C0556604}">
+  <ds:schemaRefs>
+    <ds:schemaRef ds:uri="http://schemas.microsoft.com/VisualStudio/2011/storyboarding/control"/>
+  </ds:schemaRefs>
+</ds:datastoreItem>
 </file>
</xml_diff>